<commit_message>
Enhance styling for login pages to improve accessibility and user experience
</commit_message>
<xml_diff>
--- a/Expert Speaker Finder.pptx
+++ b/Expert Speaker Finder.pptx
@@ -5,22 +5,26 @@
     <p:sldMasterId id="2147483660" r:id="rId1"/>
   </p:sldMasterIdLst>
   <p:notesMasterIdLst>
-    <p:notesMasterId r:id="rId12"/>
+    <p:notesMasterId r:id="rId16"/>
   </p:notesMasterIdLst>
   <p:handoutMasterIdLst>
-    <p:handoutMasterId r:id="rId13"/>
+    <p:handoutMasterId r:id="rId17"/>
   </p:handoutMasterIdLst>
   <p:sldIdLst>
     <p:sldId id="256" r:id="rId2"/>
     <p:sldId id="261" r:id="rId3"/>
     <p:sldId id="262" r:id="rId4"/>
     <p:sldId id="263" r:id="rId5"/>
-    <p:sldId id="264" r:id="rId6"/>
-    <p:sldId id="265" r:id="rId7"/>
-    <p:sldId id="266" r:id="rId8"/>
-    <p:sldId id="267" r:id="rId9"/>
-    <p:sldId id="268" r:id="rId10"/>
-    <p:sldId id="269" r:id="rId11"/>
+    <p:sldId id="270" r:id="rId6"/>
+    <p:sldId id="271" r:id="rId7"/>
+    <p:sldId id="264" r:id="rId8"/>
+    <p:sldId id="272" r:id="rId9"/>
+    <p:sldId id="273" r:id="rId10"/>
+    <p:sldId id="265" r:id="rId11"/>
+    <p:sldId id="266" r:id="rId12"/>
+    <p:sldId id="267" r:id="rId13"/>
+    <p:sldId id="268" r:id="rId14"/>
+    <p:sldId id="269" r:id="rId15"/>
   </p:sldIdLst>
   <p:sldSz cx="12192000" cy="6858000"/>
   <p:notesSz cx="6858000" cy="9144000"/>
@@ -128,7 +132,11 @@
             <p14:sldId id="261"/>
             <p14:sldId id="262"/>
             <p14:sldId id="263"/>
+            <p14:sldId id="270"/>
+            <p14:sldId id="271"/>
             <p14:sldId id="264"/>
+            <p14:sldId id="272"/>
+            <p14:sldId id="273"/>
             <p14:sldId id="265"/>
             <p14:sldId id="266"/>
             <p14:sldId id="267"/>
@@ -227,7 +235,7 @@
           <a:p>
             <a:fld id="{5D7D9F59-1E10-4A9B-A1B9-2BAC453C0211}" type="datetimeFigureOut">
               <a:rPr lang="en-US" smtClean="0"/>
-              <a:t>10/19/24</a:t>
+              <a:t>11/21/24</a:t>
             </a:fld>
             <a:endParaRPr lang="en-US"/>
           </a:p>
@@ -393,7 +401,7 @@
           <a:p>
             <a:fld id="{D37E6848-630C-4143-931A-3482CD985CE7}" type="datetimeFigureOut">
               <a:rPr lang="en-US" smtClean="0"/>
-              <a:t>10/19/24</a:t>
+              <a:t>11/21/24</a:t>
             </a:fld>
             <a:endParaRPr lang="en-US"/>
           </a:p>
@@ -887,7 +895,7 @@
           <a:p>
             <a:fld id="{2FFA4D39-3DF9-45F0-B12A-A60F2B84AF00}" type="datetime1">
               <a:rPr lang="en-US" smtClean="0"/>
-              <a:t>10/19/24</a:t>
+              <a:t>11/21/24</a:t>
             </a:fld>
             <a:endParaRPr lang="en-US"/>
           </a:p>
@@ -1098,7 +1106,7 @@
           <a:p>
             <a:fld id="{46BA10A5-7694-4E6D-B9EB-5FED3A264B2B}" type="datetime1">
               <a:rPr lang="en-US" smtClean="0"/>
-              <a:t>10/19/24</a:t>
+              <a:t>11/21/24</a:t>
             </a:fld>
             <a:endParaRPr lang="en-US"/>
           </a:p>
@@ -1357,7 +1365,7 @@
           <a:p>
             <a:fld id="{F9E15FEA-70C5-4284-AE7E-C5E02B60CA1B}" type="datetime1">
               <a:rPr lang="en-US" smtClean="0"/>
-              <a:t>10/19/24</a:t>
+              <a:t>11/21/24</a:t>
             </a:fld>
             <a:endParaRPr lang="en-US"/>
           </a:p>
@@ -1534,7 +1542,7 @@
           <a:p>
             <a:fld id="{FB80A95E-1C47-4CEF-BFBB-0974FDB304DB}" type="datetime1">
               <a:rPr lang="en-US" smtClean="0"/>
-              <a:t>10/19/24</a:t>
+              <a:t>11/21/24</a:t>
             </a:fld>
             <a:endParaRPr lang="en-US"/>
           </a:p>
@@ -1880,7 +1888,7 @@
           <a:p>
             <a:fld id="{CA88B2C4-D439-45A3-A117-51F3E01B60C3}" type="datetime1">
               <a:rPr lang="en-US" smtClean="0"/>
-              <a:t>10/19/24</a:t>
+              <a:t>11/21/24</a:t>
             </a:fld>
             <a:endParaRPr lang="en-US"/>
           </a:p>
@@ -2158,7 +2166,7 @@
           <a:p>
             <a:fld id="{D7067F6E-A66B-4381-8A2C-3486C09D598B}" type="datetime1">
               <a:rPr lang="en-US" smtClean="0"/>
-              <a:t>10/19/24</a:t>
+              <a:t>11/21/24</a:t>
             </a:fld>
             <a:endParaRPr lang="en-US"/>
           </a:p>
@@ -2540,7 +2548,7 @@
           <a:p>
             <a:fld id="{F896E20F-C7C1-4D22-8980-41122AA8A602}" type="datetime1">
               <a:rPr lang="en-US" smtClean="0"/>
-              <a:t>10/19/24</a:t>
+              <a:t>11/21/24</a:t>
             </a:fld>
             <a:endParaRPr lang="en-US"/>
           </a:p>
@@ -2661,7 +2669,7 @@
           <a:p>
             <a:fld id="{FCB8222F-A0B4-4627-BA7D-1684A17AC69B}" type="datetime1">
               <a:rPr lang="en-US" smtClean="0"/>
-              <a:t>10/19/24</a:t>
+              <a:t>11/21/24</a:t>
             </a:fld>
             <a:endParaRPr lang="en-US"/>
           </a:p>
@@ -2835,7 +2843,7 @@
           <a:p>
             <a:fld id="{2F57C41A-BDE4-4D8F-A183-1217B30E28B4}" type="datetime1">
               <a:rPr lang="en-US" smtClean="0"/>
-              <a:t>10/19/24</a:t>
+              <a:t>11/21/24</a:t>
             </a:fld>
             <a:endParaRPr lang="en-US"/>
           </a:p>
@@ -3192,7 +3200,7 @@
           <a:p>
             <a:fld id="{0C31206F-3307-4F0F-A434-2A5B37659217}" type="datetime1">
               <a:rPr lang="en-US" smtClean="0"/>
-              <a:t>10/19/24</a:t>
+              <a:t>11/21/24</a:t>
             </a:fld>
             <a:endParaRPr lang="en-US"/>
           </a:p>
@@ -3577,7 +3585,7 @@
           <a:p>
             <a:fld id="{27F0B680-DFE7-47E7-8C10-791358E93EC8}" type="datetime1">
               <a:rPr lang="en-US" smtClean="0"/>
-              <a:t>10/19/24</a:t>
+              <a:t>11/21/24</a:t>
             </a:fld>
             <a:endParaRPr lang="en-US"/>
           </a:p>
@@ -3867,7 +3875,7 @@
           <a:p>
             <a:fld id="{71EE931B-43B2-469F-93B9-3C56D1192037}" type="datetime1">
               <a:rPr lang="en-US" smtClean="0"/>
-              <a:t>10/19/24</a:t>
+              <a:t>11/21/24</a:t>
             </a:fld>
             <a:endParaRPr lang="en-US"/>
           </a:p>
@@ -4767,6 +4775,895 @@
         <p:cNvPr id="1" name="">
           <a:extLst>
             <a:ext uri="{FF2B5EF4-FFF2-40B4-BE49-F238E27FC236}">
+              <a16:creationId xmlns:a16="http://schemas.microsoft.com/office/drawing/2014/main" id="{C0230104-1E37-EECC-ED6D-12C761CB9122}"/>
+            </a:ext>
+          </a:extLst>
+        </p:cNvPr>
+        <p:cNvGrpSpPr/>
+        <p:nvPr/>
+      </p:nvGrpSpPr>
+      <p:grpSpPr>
+        <a:xfrm>
+          <a:off x="0" y="0"/>
+          <a:ext cx="0" cy="0"/>
+          <a:chOff x="0" y="0"/>
+          <a:chExt cx="0" cy="0"/>
+        </a:xfrm>
+      </p:grpSpPr>
+      <p:sp>
+        <p:nvSpPr>
+          <p:cNvPr id="2" name="Title 1">
+            <a:extLst>
+              <a:ext uri="{FF2B5EF4-FFF2-40B4-BE49-F238E27FC236}">
+                <a16:creationId xmlns:a16="http://schemas.microsoft.com/office/drawing/2014/main" id="{6B0CDDBD-C4B0-F5CA-EF06-BC5F7C7E0790}"/>
+              </a:ext>
+            </a:extLst>
+          </p:cNvPr>
+          <p:cNvSpPr>
+            <a:spLocks noGrp="1"/>
+          </p:cNvSpPr>
+          <p:nvPr>
+            <p:ph type="title"/>
+          </p:nvPr>
+        </p:nvSpPr>
+        <p:spPr/>
+        <p:txBody>
+          <a:bodyPr>
+            <a:normAutofit/>
+          </a:bodyPr>
+          <a:lstStyle/>
+          <a:p>
+            <a:r>
+              <a:rPr lang="en-IN" dirty="0">
+                <a:solidFill>
+                  <a:schemeClr val="accent2"/>
+                </a:solidFill>
+                <a:effectLst/>
+                <a:latin typeface="Helvetica" pitchFamily="2" charset="0"/>
+              </a:rPr>
+              <a:t>Key Features Deep Dive</a:t>
+            </a:r>
+            <a:br>
+              <a:rPr lang="en-IN" dirty="0">
+                <a:solidFill>
+                  <a:schemeClr val="accent2"/>
+                </a:solidFill>
+                <a:effectLst/>
+                <a:latin typeface="Helvetica" pitchFamily="2" charset="0"/>
+              </a:rPr>
+            </a:br>
+            <a:r>
+              <a:rPr lang="en-IN" sz="2000" dirty="0">
+                <a:solidFill>
+                  <a:schemeClr val="accent2"/>
+                </a:solidFill>
+                <a:effectLst/>
+                <a:latin typeface="Helvetica" pitchFamily="2" charset="0"/>
+              </a:rPr>
+              <a:t>5.1 Speaker Submission Process</a:t>
+            </a:r>
+            <a:endParaRPr lang="en-IN" dirty="0">
+              <a:solidFill>
+                <a:schemeClr val="accent2"/>
+              </a:solidFill>
+              <a:effectLst/>
+              <a:latin typeface="Helvetica" pitchFamily="2" charset="0"/>
+            </a:endParaRPr>
+          </a:p>
+        </p:txBody>
+      </p:sp>
+      <p:sp>
+        <p:nvSpPr>
+          <p:cNvPr id="3" name="Content Placeholder 2">
+            <a:extLst>
+              <a:ext uri="{FF2B5EF4-FFF2-40B4-BE49-F238E27FC236}">
+                <a16:creationId xmlns:a16="http://schemas.microsoft.com/office/drawing/2014/main" id="{C2F691DE-4599-9534-3204-9926F19B6520}"/>
+              </a:ext>
+            </a:extLst>
+          </p:cNvPr>
+          <p:cNvSpPr>
+            <a:spLocks noGrp="1"/>
+          </p:cNvSpPr>
+          <p:nvPr>
+            <p:ph idx="1"/>
+          </p:nvPr>
+        </p:nvSpPr>
+        <p:spPr/>
+        <p:txBody>
+          <a:bodyPr>
+            <a:normAutofit/>
+          </a:bodyPr>
+          <a:lstStyle/>
+          <a:p>
+            <a:pPr>
+              <a:buFont typeface="Arial" panose="020B0604020202020204" pitchFamily="34" charset="0"/>
+              <a:buChar char="•"/>
+            </a:pPr>
+            <a:r>
+              <a:rPr lang="en-IN" dirty="0">
+                <a:solidFill>
+                  <a:srgbClr val="313131"/>
+                </a:solidFill>
+                <a:effectLst/>
+                <a:latin typeface="Helvetica" pitchFamily="2" charset="0"/>
+              </a:rPr>
+              <a:t>Form for entering speaker details (name, expertise, background, etc.)</a:t>
+            </a:r>
+          </a:p>
+          <a:p>
+            <a:pPr>
+              <a:buFont typeface="Arial" panose="020B0604020202020204" pitchFamily="34" charset="0"/>
+              <a:buChar char="•"/>
+            </a:pPr>
+            <a:r>
+              <a:rPr lang="en-IN" dirty="0">
+                <a:solidFill>
+                  <a:srgbClr val="313131"/>
+                </a:solidFill>
+                <a:effectLst/>
+                <a:latin typeface="Helvetica" pitchFamily="2" charset="0"/>
+              </a:rPr>
+              <a:t>Automatic status assignment (pending upon submission)</a:t>
+            </a:r>
+          </a:p>
+          <a:p>
+            <a:pPr>
+              <a:buFont typeface="Arial" panose="020B0604020202020204" pitchFamily="34" charset="0"/>
+              <a:buChar char="•"/>
+            </a:pPr>
+            <a:r>
+              <a:rPr lang="en-IN" dirty="0">
+                <a:solidFill>
+                  <a:srgbClr val="313131"/>
+                </a:solidFill>
+                <a:effectLst/>
+                <a:latin typeface="Helvetica" pitchFamily="2" charset="0"/>
+              </a:rPr>
+              <a:t>Real-time validation and error handling</a:t>
+            </a:r>
+          </a:p>
+        </p:txBody>
+      </p:sp>
+      <p:sp>
+        <p:nvSpPr>
+          <p:cNvPr id="4" name="Footer Placeholder 3">
+            <a:extLst>
+              <a:ext uri="{FF2B5EF4-FFF2-40B4-BE49-F238E27FC236}">
+                <a16:creationId xmlns:a16="http://schemas.microsoft.com/office/drawing/2014/main" id="{1F96F960-F827-DA15-344D-6CF403E610D8}"/>
+              </a:ext>
+            </a:extLst>
+          </p:cNvPr>
+          <p:cNvSpPr>
+            <a:spLocks noGrp="1"/>
+          </p:cNvSpPr>
+          <p:nvPr>
+            <p:ph type="ftr" sz="quarter" idx="11"/>
+          </p:nvPr>
+        </p:nvSpPr>
+        <p:spPr/>
+        <p:txBody>
+          <a:bodyPr/>
+          <a:lstStyle/>
+          <a:p>
+            <a:r>
+              <a:rPr lang="en-US"/>
+              <a:t>Department of Computer Science &amp; Engineering ,CSPIT</a:t>
+            </a:r>
+          </a:p>
+        </p:txBody>
+      </p:sp>
+      <p:sp>
+        <p:nvSpPr>
+          <p:cNvPr id="5" name="Slide Number Placeholder 4">
+            <a:extLst>
+              <a:ext uri="{FF2B5EF4-FFF2-40B4-BE49-F238E27FC236}">
+                <a16:creationId xmlns:a16="http://schemas.microsoft.com/office/drawing/2014/main" id="{FEBB0FB4-B0C5-09AA-FEA1-7DC249AC8FC2}"/>
+              </a:ext>
+            </a:extLst>
+          </p:cNvPr>
+          <p:cNvSpPr>
+            <a:spLocks noGrp="1"/>
+          </p:cNvSpPr>
+          <p:nvPr>
+            <p:ph type="sldNum" sz="quarter" idx="12"/>
+          </p:nvPr>
+        </p:nvSpPr>
+        <p:spPr/>
+        <p:txBody>
+          <a:bodyPr/>
+          <a:lstStyle/>
+          <a:p>
+            <a:fld id="{252F294B-B6A8-44F3-8A3C-0EE5B1E3450E}" type="slidenum">
+              <a:rPr lang="en-US" smtClean="0"/>
+              <a:t>10</a:t>
+            </a:fld>
+            <a:endParaRPr lang="en-US"/>
+          </a:p>
+        </p:txBody>
+      </p:sp>
+    </p:spTree>
+    <p:extLst>
+      <p:ext uri="{BB962C8B-B14F-4D97-AF65-F5344CB8AC3E}">
+        <p14:creationId xmlns:p14="http://schemas.microsoft.com/office/powerpoint/2010/main" val="3112544591"/>
+      </p:ext>
+    </p:extLst>
+  </p:cSld>
+  <p:clrMapOvr>
+    <a:masterClrMapping/>
+  </p:clrMapOvr>
+</p:sld>
+</file>
+
+<file path=ppt/slides/slide11.xml><?xml version="1.0" encoding="utf-8"?>
+<p:sld xmlns:a="http://schemas.openxmlformats.org/drawingml/2006/main" xmlns:r="http://schemas.openxmlformats.org/officeDocument/2006/relationships" xmlns:p="http://schemas.openxmlformats.org/presentationml/2006/main">
+  <p:cSld>
+    <p:spTree>
+      <p:nvGrpSpPr>
+        <p:cNvPr id="1" name="">
+          <a:extLst>
+            <a:ext uri="{FF2B5EF4-FFF2-40B4-BE49-F238E27FC236}">
+              <a16:creationId xmlns:a16="http://schemas.microsoft.com/office/drawing/2014/main" id="{29DD08A8-8FC8-4431-B453-F74C9F214021}"/>
+            </a:ext>
+          </a:extLst>
+        </p:cNvPr>
+        <p:cNvGrpSpPr/>
+        <p:nvPr/>
+      </p:nvGrpSpPr>
+      <p:grpSpPr>
+        <a:xfrm>
+          <a:off x="0" y="0"/>
+          <a:ext cx="0" cy="0"/>
+          <a:chOff x="0" y="0"/>
+          <a:chExt cx="0" cy="0"/>
+        </a:xfrm>
+      </p:grpSpPr>
+      <p:sp>
+        <p:nvSpPr>
+          <p:cNvPr id="2" name="Title 1">
+            <a:extLst>
+              <a:ext uri="{FF2B5EF4-FFF2-40B4-BE49-F238E27FC236}">
+                <a16:creationId xmlns:a16="http://schemas.microsoft.com/office/drawing/2014/main" id="{D0B46626-2BD7-D88A-5FC7-63E8C517854D}"/>
+              </a:ext>
+            </a:extLst>
+          </p:cNvPr>
+          <p:cNvSpPr>
+            <a:spLocks noGrp="1"/>
+          </p:cNvSpPr>
+          <p:nvPr>
+            <p:ph type="title"/>
+          </p:nvPr>
+        </p:nvSpPr>
+        <p:spPr/>
+        <p:txBody>
+          <a:bodyPr>
+            <a:normAutofit/>
+          </a:bodyPr>
+          <a:lstStyle/>
+          <a:p>
+            <a:r>
+              <a:rPr lang="en-IN" dirty="0">
+                <a:solidFill>
+                  <a:schemeClr val="accent2"/>
+                </a:solidFill>
+                <a:effectLst/>
+                <a:latin typeface="Helvetica" pitchFamily="2" charset="0"/>
+              </a:rPr>
+              <a:t>Speaker Suggestion Form</a:t>
+            </a:r>
+          </a:p>
+        </p:txBody>
+      </p:sp>
+      <p:sp>
+        <p:nvSpPr>
+          <p:cNvPr id="3" name="Content Placeholder 2">
+            <a:extLst>
+              <a:ext uri="{FF2B5EF4-FFF2-40B4-BE49-F238E27FC236}">
+                <a16:creationId xmlns:a16="http://schemas.microsoft.com/office/drawing/2014/main" id="{8CAE07D5-F745-34A0-53F3-7DC9B295FF8F}"/>
+              </a:ext>
+            </a:extLst>
+          </p:cNvPr>
+          <p:cNvSpPr>
+            <a:spLocks noGrp="1"/>
+          </p:cNvSpPr>
+          <p:nvPr>
+            <p:ph idx="1"/>
+          </p:nvPr>
+        </p:nvSpPr>
+        <p:spPr/>
+        <p:txBody>
+          <a:bodyPr>
+            <a:normAutofit/>
+          </a:bodyPr>
+          <a:lstStyle/>
+          <a:p>
+            <a:r>
+              <a:rPr lang="en-IN" dirty="0">
+                <a:solidFill>
+                  <a:srgbClr val="313131"/>
+                </a:solidFill>
+                <a:effectLst/>
+                <a:latin typeface="Helvetica" pitchFamily="2" charset="0"/>
+              </a:rPr>
+              <a:t>The form captures all necessary details</a:t>
+            </a:r>
+          </a:p>
+          <a:p>
+            <a:r>
+              <a:rPr lang="en-IN" dirty="0">
+                <a:solidFill>
+                  <a:srgbClr val="313131"/>
+                </a:solidFill>
+                <a:effectLst/>
+                <a:latin typeface="Helvetica" pitchFamily="2" charset="0"/>
+              </a:rPr>
+              <a:t>for evaluating speaker submissions. Form</a:t>
+            </a:r>
+          </a:p>
+          <a:p>
+            <a:r>
+              <a:rPr lang="en-IN" dirty="0">
+                <a:solidFill>
+                  <a:srgbClr val="313131"/>
+                </a:solidFill>
+                <a:effectLst/>
+                <a:latin typeface="Helvetica" pitchFamily="2" charset="0"/>
+              </a:rPr>
+              <a:t>fields include:</a:t>
+            </a:r>
+          </a:p>
+          <a:p>
+            <a:r>
+              <a:rPr lang="en-IN" dirty="0">
+                <a:solidFill>
+                  <a:srgbClr val="313131"/>
+                </a:solidFill>
+                <a:effectLst/>
+                <a:latin typeface="Helvetica" pitchFamily="2" charset="0"/>
+              </a:rPr>
+              <a:t>- Speaker Name</a:t>
+            </a:r>
+          </a:p>
+          <a:p>
+            <a:r>
+              <a:rPr lang="en-IN" dirty="0">
+                <a:solidFill>
+                  <a:srgbClr val="313131"/>
+                </a:solidFill>
+                <a:effectLst/>
+                <a:latin typeface="Helvetica" pitchFamily="2" charset="0"/>
+              </a:rPr>
+              <a:t>- Field of Expertise</a:t>
+            </a:r>
+          </a:p>
+          <a:p>
+            <a:r>
+              <a:rPr lang="en-IN" dirty="0">
+                <a:solidFill>
+                  <a:srgbClr val="313131"/>
+                </a:solidFill>
+                <a:effectLst/>
+                <a:latin typeface="Helvetica" pitchFamily="2" charset="0"/>
+              </a:rPr>
+              <a:t>- Professional Background</a:t>
+            </a:r>
+          </a:p>
+          <a:p>
+            <a:r>
+              <a:rPr lang="en-IN" dirty="0">
+                <a:solidFill>
+                  <a:srgbClr val="313131"/>
+                </a:solidFill>
+                <a:effectLst/>
+                <a:latin typeface="Helvetica" pitchFamily="2" charset="0"/>
+              </a:rPr>
+              <a:t>- Why the speaker is recommended for a</a:t>
+            </a:r>
+          </a:p>
+          <a:p>
+            <a:r>
+              <a:rPr lang="en-IN" dirty="0">
+                <a:solidFill>
+                  <a:srgbClr val="313131"/>
+                </a:solidFill>
+                <a:effectLst/>
+                <a:latin typeface="Helvetica" pitchFamily="2" charset="0"/>
+              </a:rPr>
+              <a:t>seminar.</a:t>
+            </a:r>
+          </a:p>
+        </p:txBody>
+      </p:sp>
+      <p:sp>
+        <p:nvSpPr>
+          <p:cNvPr id="4" name="Footer Placeholder 3">
+            <a:extLst>
+              <a:ext uri="{FF2B5EF4-FFF2-40B4-BE49-F238E27FC236}">
+                <a16:creationId xmlns:a16="http://schemas.microsoft.com/office/drawing/2014/main" id="{4CA14248-4E3D-56C1-9D71-11C1DE39F3B6}"/>
+              </a:ext>
+            </a:extLst>
+          </p:cNvPr>
+          <p:cNvSpPr>
+            <a:spLocks noGrp="1"/>
+          </p:cNvSpPr>
+          <p:nvPr>
+            <p:ph type="ftr" sz="quarter" idx="11"/>
+          </p:nvPr>
+        </p:nvSpPr>
+        <p:spPr/>
+        <p:txBody>
+          <a:bodyPr/>
+          <a:lstStyle/>
+          <a:p>
+            <a:r>
+              <a:rPr lang="en-US"/>
+              <a:t>Department of Computer Science &amp; Engineering ,CSPIT</a:t>
+            </a:r>
+          </a:p>
+        </p:txBody>
+      </p:sp>
+      <p:sp>
+        <p:nvSpPr>
+          <p:cNvPr id="5" name="Slide Number Placeholder 4">
+            <a:extLst>
+              <a:ext uri="{FF2B5EF4-FFF2-40B4-BE49-F238E27FC236}">
+                <a16:creationId xmlns:a16="http://schemas.microsoft.com/office/drawing/2014/main" id="{E3358547-7D49-8318-A174-16C0940B9576}"/>
+              </a:ext>
+            </a:extLst>
+          </p:cNvPr>
+          <p:cNvSpPr>
+            <a:spLocks noGrp="1"/>
+          </p:cNvSpPr>
+          <p:nvPr>
+            <p:ph type="sldNum" sz="quarter" idx="12"/>
+          </p:nvPr>
+        </p:nvSpPr>
+        <p:spPr/>
+        <p:txBody>
+          <a:bodyPr/>
+          <a:lstStyle/>
+          <a:p>
+            <a:fld id="{252F294B-B6A8-44F3-8A3C-0EE5B1E3450E}" type="slidenum">
+              <a:rPr lang="en-US" smtClean="0"/>
+              <a:t>11</a:t>
+            </a:fld>
+            <a:endParaRPr lang="en-US"/>
+          </a:p>
+        </p:txBody>
+      </p:sp>
+    </p:spTree>
+    <p:extLst>
+      <p:ext uri="{BB962C8B-B14F-4D97-AF65-F5344CB8AC3E}">
+        <p14:creationId xmlns:p14="http://schemas.microsoft.com/office/powerpoint/2010/main" val="2573806196"/>
+      </p:ext>
+    </p:extLst>
+  </p:cSld>
+  <p:clrMapOvr>
+    <a:masterClrMapping/>
+  </p:clrMapOvr>
+</p:sld>
+</file>
+
+<file path=ppt/slides/slide12.xml><?xml version="1.0" encoding="utf-8"?>
+<p:sld xmlns:a="http://schemas.openxmlformats.org/drawingml/2006/main" xmlns:r="http://schemas.openxmlformats.org/officeDocument/2006/relationships" xmlns:p="http://schemas.openxmlformats.org/presentationml/2006/main">
+  <p:cSld>
+    <p:spTree>
+      <p:nvGrpSpPr>
+        <p:cNvPr id="1" name="">
+          <a:extLst>
+            <a:ext uri="{FF2B5EF4-FFF2-40B4-BE49-F238E27FC236}">
+              <a16:creationId xmlns:a16="http://schemas.microsoft.com/office/drawing/2014/main" id="{BF7F08B6-1818-B209-1F39-8CFC6154E6ED}"/>
+            </a:ext>
+          </a:extLst>
+        </p:cNvPr>
+        <p:cNvGrpSpPr/>
+        <p:nvPr/>
+      </p:nvGrpSpPr>
+      <p:grpSpPr>
+        <a:xfrm>
+          <a:off x="0" y="0"/>
+          <a:ext cx="0" cy="0"/>
+          <a:chOff x="0" y="0"/>
+          <a:chExt cx="0" cy="0"/>
+        </a:xfrm>
+      </p:grpSpPr>
+      <p:sp>
+        <p:nvSpPr>
+          <p:cNvPr id="2" name="Title 1">
+            <a:extLst>
+              <a:ext uri="{FF2B5EF4-FFF2-40B4-BE49-F238E27FC236}">
+                <a16:creationId xmlns:a16="http://schemas.microsoft.com/office/drawing/2014/main" id="{24F08AF9-4BE9-E3EE-595C-93FBA96C3D6A}"/>
+              </a:ext>
+            </a:extLst>
+          </p:cNvPr>
+          <p:cNvSpPr>
+            <a:spLocks noGrp="1"/>
+          </p:cNvSpPr>
+          <p:nvPr>
+            <p:ph type="title"/>
+          </p:nvPr>
+        </p:nvSpPr>
+        <p:spPr/>
+        <p:txBody>
+          <a:bodyPr>
+            <a:normAutofit/>
+          </a:bodyPr>
+          <a:lstStyle/>
+          <a:p>
+            <a:r>
+              <a:rPr lang="en-IN" dirty="0">
+                <a:solidFill>
+                  <a:schemeClr val="accent2"/>
+                </a:solidFill>
+                <a:effectLst/>
+                <a:latin typeface="Helvetica" pitchFamily="2" charset="0"/>
+              </a:rPr>
+              <a:t>Admin Dashboard</a:t>
+            </a:r>
+          </a:p>
+        </p:txBody>
+      </p:sp>
+      <p:sp>
+        <p:nvSpPr>
+          <p:cNvPr id="3" name="Content Placeholder 2">
+            <a:extLst>
+              <a:ext uri="{FF2B5EF4-FFF2-40B4-BE49-F238E27FC236}">
+                <a16:creationId xmlns:a16="http://schemas.microsoft.com/office/drawing/2014/main" id="{814F871E-BE43-356C-90A3-B12934C01FEB}"/>
+              </a:ext>
+            </a:extLst>
+          </p:cNvPr>
+          <p:cNvSpPr>
+            <a:spLocks noGrp="1"/>
+          </p:cNvSpPr>
+          <p:nvPr>
+            <p:ph idx="1"/>
+          </p:nvPr>
+        </p:nvSpPr>
+        <p:spPr/>
+        <p:txBody>
+          <a:bodyPr>
+            <a:normAutofit/>
+          </a:bodyPr>
+          <a:lstStyle/>
+          <a:p>
+            <a:r>
+              <a:rPr lang="en-IN" dirty="0">
+                <a:solidFill>
+                  <a:srgbClr val="313131"/>
+                </a:solidFill>
+                <a:effectLst/>
+                <a:latin typeface="Helvetica" pitchFamily="2" charset="0"/>
+              </a:rPr>
+              <a:t>Admins can view and filter all speaker</a:t>
+            </a:r>
+          </a:p>
+          <a:p>
+            <a:r>
+              <a:rPr lang="en-IN" dirty="0">
+                <a:solidFill>
+                  <a:srgbClr val="313131"/>
+                </a:solidFill>
+                <a:effectLst/>
+                <a:latin typeface="Helvetica" pitchFamily="2" charset="0"/>
+              </a:rPr>
+              <a:t>submissions. Features include:</a:t>
+            </a:r>
+          </a:p>
+          <a:p>
+            <a:r>
+              <a:rPr lang="en-IN" dirty="0">
+                <a:solidFill>
+                  <a:srgbClr val="313131"/>
+                </a:solidFill>
+                <a:effectLst/>
+                <a:latin typeface="Helvetica" pitchFamily="2" charset="0"/>
+              </a:rPr>
+              <a:t>- View Submission Details: See full</a:t>
+            </a:r>
+          </a:p>
+          <a:p>
+            <a:r>
+              <a:rPr lang="en-IN" dirty="0">
+                <a:solidFill>
+                  <a:srgbClr val="313131"/>
+                </a:solidFill>
+                <a:effectLst/>
+                <a:latin typeface="Helvetica" pitchFamily="2" charset="0"/>
+              </a:rPr>
+              <a:t>information about each suggested</a:t>
+            </a:r>
+          </a:p>
+          <a:p>
+            <a:r>
+              <a:rPr lang="en-IN" dirty="0">
+                <a:solidFill>
+                  <a:srgbClr val="313131"/>
+                </a:solidFill>
+                <a:effectLst/>
+                <a:latin typeface="Helvetica" pitchFamily="2" charset="0"/>
+              </a:rPr>
+              <a:t>speaker.</a:t>
+            </a:r>
+          </a:p>
+          <a:p>
+            <a:r>
+              <a:rPr lang="en-IN" dirty="0">
+                <a:solidFill>
+                  <a:srgbClr val="313131"/>
+                </a:solidFill>
+                <a:effectLst/>
+                <a:latin typeface="Helvetica" pitchFamily="2" charset="0"/>
+              </a:rPr>
+              <a:t>- Accept or Reject Submissions: Admins</a:t>
+            </a:r>
+          </a:p>
+          <a:p>
+            <a:r>
+              <a:rPr lang="en-IN" dirty="0">
+                <a:solidFill>
+                  <a:srgbClr val="313131"/>
+                </a:solidFill>
+                <a:effectLst/>
+                <a:latin typeface="Helvetica" pitchFamily="2" charset="0"/>
+              </a:rPr>
+              <a:t>can decide which speakers are suitable for</a:t>
+            </a:r>
+          </a:p>
+          <a:p>
+            <a:r>
+              <a:rPr lang="en-IN" dirty="0">
+                <a:solidFill>
+                  <a:srgbClr val="313131"/>
+                </a:solidFill>
+                <a:effectLst/>
+                <a:latin typeface="Helvetica" pitchFamily="2" charset="0"/>
+              </a:rPr>
+              <a:t>the event.</a:t>
+            </a:r>
+          </a:p>
+        </p:txBody>
+      </p:sp>
+      <p:sp>
+        <p:nvSpPr>
+          <p:cNvPr id="4" name="Footer Placeholder 3">
+            <a:extLst>
+              <a:ext uri="{FF2B5EF4-FFF2-40B4-BE49-F238E27FC236}">
+                <a16:creationId xmlns:a16="http://schemas.microsoft.com/office/drawing/2014/main" id="{1D424068-05BA-FA45-9A94-3B2F1C5EC5DC}"/>
+              </a:ext>
+            </a:extLst>
+          </p:cNvPr>
+          <p:cNvSpPr>
+            <a:spLocks noGrp="1"/>
+          </p:cNvSpPr>
+          <p:nvPr>
+            <p:ph type="ftr" sz="quarter" idx="11"/>
+          </p:nvPr>
+        </p:nvSpPr>
+        <p:spPr/>
+        <p:txBody>
+          <a:bodyPr/>
+          <a:lstStyle/>
+          <a:p>
+            <a:r>
+              <a:rPr lang="en-US"/>
+              <a:t>Department of Computer Science &amp; Engineering ,CSPIT</a:t>
+            </a:r>
+          </a:p>
+        </p:txBody>
+      </p:sp>
+      <p:sp>
+        <p:nvSpPr>
+          <p:cNvPr id="5" name="Slide Number Placeholder 4">
+            <a:extLst>
+              <a:ext uri="{FF2B5EF4-FFF2-40B4-BE49-F238E27FC236}">
+                <a16:creationId xmlns:a16="http://schemas.microsoft.com/office/drawing/2014/main" id="{6EFAFB62-CD33-EB2F-338B-8D8F4428214B}"/>
+              </a:ext>
+            </a:extLst>
+          </p:cNvPr>
+          <p:cNvSpPr>
+            <a:spLocks noGrp="1"/>
+          </p:cNvSpPr>
+          <p:nvPr>
+            <p:ph type="sldNum" sz="quarter" idx="12"/>
+          </p:nvPr>
+        </p:nvSpPr>
+        <p:spPr/>
+        <p:txBody>
+          <a:bodyPr/>
+          <a:lstStyle/>
+          <a:p>
+            <a:fld id="{252F294B-B6A8-44F3-8A3C-0EE5B1E3450E}" type="slidenum">
+              <a:rPr lang="en-US" smtClean="0"/>
+              <a:t>12</a:t>
+            </a:fld>
+            <a:endParaRPr lang="en-US"/>
+          </a:p>
+        </p:txBody>
+      </p:sp>
+    </p:spTree>
+    <p:extLst>
+      <p:ext uri="{BB962C8B-B14F-4D97-AF65-F5344CB8AC3E}">
+        <p14:creationId xmlns:p14="http://schemas.microsoft.com/office/powerpoint/2010/main" val="1873383182"/>
+      </p:ext>
+    </p:extLst>
+  </p:cSld>
+  <p:clrMapOvr>
+    <a:masterClrMapping/>
+  </p:clrMapOvr>
+</p:sld>
+</file>
+
+<file path=ppt/slides/slide13.xml><?xml version="1.0" encoding="utf-8"?>
+<p:sld xmlns:a="http://schemas.openxmlformats.org/drawingml/2006/main" xmlns:r="http://schemas.openxmlformats.org/officeDocument/2006/relationships" xmlns:p="http://schemas.openxmlformats.org/presentationml/2006/main">
+  <p:cSld>
+    <p:spTree>
+      <p:nvGrpSpPr>
+        <p:cNvPr id="1" name="">
+          <a:extLst>
+            <a:ext uri="{FF2B5EF4-FFF2-40B4-BE49-F238E27FC236}">
+              <a16:creationId xmlns:a16="http://schemas.microsoft.com/office/drawing/2014/main" id="{0F42FEC7-DD30-90A0-36A9-4C9D5FD0EC85}"/>
+            </a:ext>
+          </a:extLst>
+        </p:cNvPr>
+        <p:cNvGrpSpPr/>
+        <p:nvPr/>
+      </p:nvGrpSpPr>
+      <p:grpSpPr>
+        <a:xfrm>
+          <a:off x="0" y="0"/>
+          <a:ext cx="0" cy="0"/>
+          <a:chOff x="0" y="0"/>
+          <a:chExt cx="0" cy="0"/>
+        </a:xfrm>
+      </p:grpSpPr>
+      <p:sp>
+        <p:nvSpPr>
+          <p:cNvPr id="2" name="Title 1">
+            <a:extLst>
+              <a:ext uri="{FF2B5EF4-FFF2-40B4-BE49-F238E27FC236}">
+                <a16:creationId xmlns:a16="http://schemas.microsoft.com/office/drawing/2014/main" id="{DDF2BB73-0F54-0EE0-A6EB-4DA6210F9BA2}"/>
+              </a:ext>
+            </a:extLst>
+          </p:cNvPr>
+          <p:cNvSpPr>
+            <a:spLocks noGrp="1"/>
+          </p:cNvSpPr>
+          <p:nvPr>
+            <p:ph type="title"/>
+          </p:nvPr>
+        </p:nvSpPr>
+        <p:spPr/>
+        <p:txBody>
+          <a:bodyPr>
+            <a:normAutofit/>
+          </a:bodyPr>
+          <a:lstStyle/>
+          <a:p>
+            <a:r>
+              <a:rPr lang="en-IN" dirty="0">
+                <a:solidFill>
+                  <a:schemeClr val="accent2"/>
+                </a:solidFill>
+                <a:effectLst/>
+                <a:latin typeface="Helvetica" pitchFamily="2" charset="0"/>
+              </a:rPr>
+              <a:t>Workflow Diagram</a:t>
+            </a:r>
+          </a:p>
+        </p:txBody>
+      </p:sp>
+      <p:pic>
+        <p:nvPicPr>
+          <p:cNvPr id="7" name="Content Placeholder 6">
+            <a:extLst>
+              <a:ext uri="{FF2B5EF4-FFF2-40B4-BE49-F238E27FC236}">
+                <a16:creationId xmlns:a16="http://schemas.microsoft.com/office/drawing/2014/main" id="{75360005-B2A6-87B1-94CE-AD5039877BCA}"/>
+              </a:ext>
+            </a:extLst>
+          </p:cNvPr>
+          <p:cNvPicPr>
+            <a:picLocks noGrp="1" noChangeAspect="1"/>
+          </p:cNvPicPr>
+          <p:nvPr>
+            <p:ph idx="1"/>
+          </p:nvPr>
+        </p:nvPicPr>
+        <p:blipFill>
+          <a:blip r:embed="rId2">
+            <a:extLst>
+              <a:ext uri="{28A0092B-C50C-407E-A947-70E740481C1C}">
+                <a14:useLocalDpi xmlns:a14="http://schemas.microsoft.com/office/drawing/2010/main" val="0"/>
+              </a:ext>
+            </a:extLst>
+          </a:blip>
+          <a:stretch>
+            <a:fillRect/>
+          </a:stretch>
+        </p:blipFill>
+        <p:spPr>
+          <a:xfrm>
+            <a:off x="135884" y="3299791"/>
+            <a:ext cx="12007373" cy="1113183"/>
+          </a:xfrm>
+        </p:spPr>
+      </p:pic>
+      <p:sp>
+        <p:nvSpPr>
+          <p:cNvPr id="4" name="Footer Placeholder 3">
+            <a:extLst>
+              <a:ext uri="{FF2B5EF4-FFF2-40B4-BE49-F238E27FC236}">
+                <a16:creationId xmlns:a16="http://schemas.microsoft.com/office/drawing/2014/main" id="{0CB1DE57-C864-DB64-E4E3-0422C25DEA33}"/>
+              </a:ext>
+            </a:extLst>
+          </p:cNvPr>
+          <p:cNvSpPr>
+            <a:spLocks noGrp="1"/>
+          </p:cNvSpPr>
+          <p:nvPr>
+            <p:ph type="ftr" sz="quarter" idx="11"/>
+          </p:nvPr>
+        </p:nvSpPr>
+        <p:spPr/>
+        <p:txBody>
+          <a:bodyPr/>
+          <a:lstStyle/>
+          <a:p>
+            <a:r>
+              <a:rPr lang="en-US"/>
+              <a:t>Department of Computer Science &amp; Engineering ,CSPIT</a:t>
+            </a:r>
+          </a:p>
+        </p:txBody>
+      </p:sp>
+      <p:sp>
+        <p:nvSpPr>
+          <p:cNvPr id="5" name="Slide Number Placeholder 4">
+            <a:extLst>
+              <a:ext uri="{FF2B5EF4-FFF2-40B4-BE49-F238E27FC236}">
+                <a16:creationId xmlns:a16="http://schemas.microsoft.com/office/drawing/2014/main" id="{52F98637-76F0-105E-6CFD-3B02F45FBC7F}"/>
+              </a:ext>
+            </a:extLst>
+          </p:cNvPr>
+          <p:cNvSpPr>
+            <a:spLocks noGrp="1"/>
+          </p:cNvSpPr>
+          <p:nvPr>
+            <p:ph type="sldNum" sz="quarter" idx="12"/>
+          </p:nvPr>
+        </p:nvSpPr>
+        <p:spPr/>
+        <p:txBody>
+          <a:bodyPr/>
+          <a:lstStyle/>
+          <a:p>
+            <a:fld id="{252F294B-B6A8-44F3-8A3C-0EE5B1E3450E}" type="slidenum">
+              <a:rPr lang="en-US" smtClean="0"/>
+              <a:t>13</a:t>
+            </a:fld>
+            <a:endParaRPr lang="en-US"/>
+          </a:p>
+        </p:txBody>
+      </p:sp>
+    </p:spTree>
+    <p:extLst>
+      <p:ext uri="{BB962C8B-B14F-4D97-AF65-F5344CB8AC3E}">
+        <p14:creationId xmlns:p14="http://schemas.microsoft.com/office/powerpoint/2010/main" val="2120358248"/>
+      </p:ext>
+    </p:extLst>
+  </p:cSld>
+  <p:clrMapOvr>
+    <a:masterClrMapping/>
+  </p:clrMapOvr>
+</p:sld>
+</file>
+
+<file path=ppt/slides/slide14.xml><?xml version="1.0" encoding="utf-8"?>
+<p:sld xmlns:a="http://schemas.openxmlformats.org/drawingml/2006/main" xmlns:r="http://schemas.openxmlformats.org/officeDocument/2006/relationships" xmlns:p="http://schemas.openxmlformats.org/presentationml/2006/main">
+  <p:cSld>
+    <p:spTree>
+      <p:nvGrpSpPr>
+        <p:cNvPr id="1" name="">
+          <a:extLst>
+            <a:ext uri="{FF2B5EF4-FFF2-40B4-BE49-F238E27FC236}">
               <a16:creationId xmlns:a16="http://schemas.microsoft.com/office/drawing/2014/main" id="{C8DD13D1-4CC1-8941-A974-C67C7FDAFFE5}"/>
             </a:ext>
           </a:extLst>
@@ -4869,7 +5766,7 @@
           <a:p>
             <a:fld id="{252F294B-B6A8-44F3-8A3C-0EE5B1E3450E}" type="slidenum">
               <a:rPr lang="en-US" smtClean="0"/>
-              <a:t>10</a:t>
+              <a:t>14</a:t>
             </a:fld>
             <a:endParaRPr lang="en-US"/>
           </a:p>
@@ -5004,18 +5901,20 @@
           </a:xfrm>
         </p:spPr>
         <p:txBody>
-          <a:bodyPr/>
-          <a:lstStyle/>
-          <a:p>
-            <a:r>
-              <a:rPr lang="en-US" dirty="0">
+          <a:bodyPr>
+            <a:normAutofit/>
+          </a:bodyPr>
+          <a:lstStyle/>
+          <a:p>
+            <a:r>
+              <a:rPr lang="en-US" b="1" dirty="0">
                 <a:solidFill>
                   <a:schemeClr val="accent1">
                     <a:lumMod val="75000"/>
                   </a:schemeClr>
                 </a:solidFill>
               </a:rPr>
-              <a:t>Introduction</a:t>
+              <a:t>1. Introduction</a:t>
             </a:r>
           </a:p>
         </p:txBody>
@@ -5084,8 +5983,8 @@
         </p:nvSpPr>
         <p:spPr>
           <a:xfrm>
-            <a:off x="1088487" y="2017643"/>
-            <a:ext cx="7374834" cy="3693319"/>
+            <a:off x="2193354" y="2057400"/>
+            <a:ext cx="7374834" cy="1754326"/>
           </a:xfrm>
           <a:prstGeom prst="rect">
             <a:avLst/>
@@ -5099,150 +5998,9 @@
           <a:lstStyle/>
           <a:p>
             <a:r>
-              <a:rPr lang="en-IN" dirty="0">
-                <a:solidFill>
-                  <a:srgbClr val="313131"/>
-                </a:solidFill>
-                <a:effectLst/>
-                <a:latin typeface="Helvetica" pitchFamily="2" charset="0"/>
-              </a:rPr>
-              <a:t>The Expert Speaker Finder is an</a:t>
-            </a:r>
-          </a:p>
-          <a:p>
-            <a:r>
-              <a:rPr lang="en-IN" dirty="0">
-                <a:solidFill>
-                  <a:srgbClr val="313131"/>
-                </a:solidFill>
-                <a:effectLst/>
-                <a:latin typeface="Helvetica" pitchFamily="2" charset="0"/>
-              </a:rPr>
-              <a:t>innovative platform designed to help</a:t>
-            </a:r>
-          </a:p>
-          <a:p>
-            <a:r>
-              <a:rPr lang="en-IN" dirty="0">
-                <a:solidFill>
-                  <a:srgbClr val="313131"/>
-                </a:solidFill>
-                <a:effectLst/>
-                <a:latin typeface="Helvetica" pitchFamily="2" charset="0"/>
-              </a:rPr>
-              <a:t>universities find and invite expert</a:t>
-            </a:r>
-          </a:p>
-          <a:p>
-            <a:r>
-              <a:rPr lang="en-IN" dirty="0">
-                <a:solidFill>
-                  <a:srgbClr val="313131"/>
-                </a:solidFill>
-                <a:effectLst/>
-                <a:latin typeface="Helvetica" pitchFamily="2" charset="0"/>
-              </a:rPr>
-              <a:t>speakers for seminars and workshops.</a:t>
-            </a:r>
-          </a:p>
-          <a:p>
-            <a:r>
-              <a:rPr lang="en-IN" dirty="0">
-                <a:solidFill>
-                  <a:srgbClr val="313131"/>
-                </a:solidFill>
-                <a:effectLst/>
-                <a:latin typeface="Helvetica" pitchFamily="2" charset="0"/>
-              </a:rPr>
-              <a:t>Students can suggest potential speakers,</a:t>
-            </a:r>
-          </a:p>
-          <a:p>
-            <a:r>
-              <a:rPr lang="en-IN" dirty="0">
-                <a:solidFill>
-                  <a:srgbClr val="313131"/>
-                </a:solidFill>
-                <a:effectLst/>
-                <a:latin typeface="Helvetica" pitchFamily="2" charset="0"/>
-              </a:rPr>
-              <a:t>and university admins can review</a:t>
-            </a:r>
-          </a:p>
-          <a:p>
-            <a:r>
-              <a:rPr lang="en-IN" dirty="0">
-                <a:solidFill>
-                  <a:srgbClr val="313131"/>
-                </a:solidFill>
-                <a:effectLst/>
-                <a:latin typeface="Helvetica" pitchFamily="2" charset="0"/>
-              </a:rPr>
-              <a:t>submissions to select the most suitable</a:t>
-            </a:r>
-          </a:p>
-          <a:p>
-            <a:r>
-              <a:rPr lang="en-IN" dirty="0">
-                <a:solidFill>
-                  <a:srgbClr val="313131"/>
-                </a:solidFill>
-                <a:effectLst/>
-                <a:latin typeface="Helvetica" pitchFamily="2" charset="0"/>
-              </a:rPr>
-              <a:t>speakers.</a:t>
-            </a:r>
-          </a:p>
-          <a:p>
-            <a:r>
-              <a:rPr lang="en-IN" dirty="0">
-                <a:solidFill>
-                  <a:srgbClr val="313131"/>
-                </a:solidFill>
-                <a:effectLst/>
-                <a:latin typeface="Helvetica" pitchFamily="2" charset="0"/>
-              </a:rPr>
-              <a:t>This tool facilitates collaboration between</a:t>
-            </a:r>
-          </a:p>
-          <a:p>
-            <a:r>
-              <a:rPr lang="en-IN" dirty="0">
-                <a:solidFill>
-                  <a:srgbClr val="313131"/>
-                </a:solidFill>
-                <a:effectLst/>
-                <a:latin typeface="Helvetica" pitchFamily="2" charset="0"/>
-              </a:rPr>
-              <a:t>students and university administration,</a:t>
-            </a:r>
-          </a:p>
-          <a:p>
-            <a:r>
-              <a:rPr lang="en-IN" dirty="0">
-                <a:solidFill>
-                  <a:srgbClr val="313131"/>
-                </a:solidFill>
-                <a:effectLst/>
-                <a:latin typeface="Helvetica" pitchFamily="2" charset="0"/>
-              </a:rPr>
-              <a:t>encouraging a wider variety of guest</a:t>
-            </a:r>
-          </a:p>
-          <a:p>
-            <a:r>
-              <a:rPr lang="en-IN" dirty="0">
-                <a:solidFill>
-                  <a:srgbClr val="313131"/>
-                </a:solidFill>
-                <a:effectLst/>
-                <a:latin typeface="Helvetica" pitchFamily="2" charset="0"/>
-              </a:rPr>
-              <a:t>speakers.</a:t>
-            </a:r>
-          </a:p>
-          <a:p>
-            <a:endParaRPr lang="en-US" dirty="0"/>
+              <a:rPr lang="en-US" dirty="0"/>
+              <a:t>The Expert Speaker Finder is an innovative web application designed to bridge the gap between academic institutions and industry experts. It streamlines the process of identifying, submitting, and approving guest speakers for academic events, seminars, and lectures. This platform enhances the quality of educational experiences by facilitating access to a diverse pool of professionals across various fields of expertise.</a:t>
+            </a:r>
           </a:p>
         </p:txBody>
       </p:sp>
@@ -5307,7 +6065,7 @@
                 <a:effectLst/>
                 <a:latin typeface="Helvetica" pitchFamily="2" charset="0"/>
               </a:rPr>
-              <a:t>Why Expert Speakers Matter?</a:t>
+              <a:t>2. Project Overview</a:t>
             </a:r>
             <a:endParaRPr lang="en-US" dirty="0">
               <a:solidFill>
@@ -5338,103 +6096,66 @@
           <a:bodyPr/>
           <a:lstStyle/>
           <a:p>
-            <a:r>
-              <a:rPr lang="en-IN" dirty="0">
-                <a:solidFill>
-                  <a:srgbClr val="313131"/>
-                </a:solidFill>
-                <a:effectLst/>
-                <a:latin typeface="Helvetica" pitchFamily="2" charset="0"/>
-              </a:rPr>
-              <a:t>Inviting expert speakers provides several</a:t>
-            </a:r>
-          </a:p>
-          <a:p>
-            <a:r>
-              <a:rPr lang="en-IN" dirty="0">
-                <a:solidFill>
-                  <a:srgbClr val="313131"/>
-                </a:solidFill>
-                <a:effectLst/>
-                <a:latin typeface="Helvetica" pitchFamily="2" charset="0"/>
-              </a:rPr>
-              <a:t>benefits to universities:</a:t>
-            </a:r>
-          </a:p>
-          <a:p>
-            <a:r>
-              <a:rPr lang="en-IN" dirty="0">
-                <a:solidFill>
-                  <a:srgbClr val="313131"/>
-                </a:solidFill>
-                <a:effectLst/>
-                <a:latin typeface="Helvetica" pitchFamily="2" charset="0"/>
-              </a:rPr>
-              <a:t>1. Expanding students' exposure to real-</a:t>
-            </a:r>
-          </a:p>
-          <a:p>
-            <a:r>
-              <a:rPr lang="en-IN" dirty="0">
-                <a:solidFill>
-                  <a:srgbClr val="313131"/>
-                </a:solidFill>
-                <a:effectLst/>
-                <a:latin typeface="Helvetica" pitchFamily="2" charset="0"/>
-              </a:rPr>
-              <a:t>world expertise.</a:t>
-            </a:r>
-          </a:p>
-          <a:p>
-            <a:r>
-              <a:rPr lang="en-IN" dirty="0">
-                <a:solidFill>
-                  <a:srgbClr val="313131"/>
-                </a:solidFill>
-                <a:effectLst/>
-                <a:latin typeface="Helvetica" pitchFamily="2" charset="0"/>
-              </a:rPr>
-              <a:t>2. Networking opportunities with industry</a:t>
-            </a:r>
-          </a:p>
-          <a:p>
-            <a:r>
-              <a:rPr lang="en-IN" dirty="0">
-                <a:solidFill>
-                  <a:srgbClr val="313131"/>
-                </a:solidFill>
-                <a:effectLst/>
-                <a:latin typeface="Helvetica" pitchFamily="2" charset="0"/>
-              </a:rPr>
-              <a:t>professionals.</a:t>
-            </a:r>
-          </a:p>
-          <a:p>
-            <a:r>
-              <a:rPr lang="en-IN" dirty="0">
-                <a:solidFill>
-                  <a:srgbClr val="313131"/>
-                </a:solidFill>
-                <a:effectLst/>
-                <a:latin typeface="Helvetica" pitchFamily="2" charset="0"/>
-              </a:rPr>
-              <a:t>3. Bridging the gap between academia</a:t>
-            </a:r>
-          </a:p>
-          <a:p>
-            <a:r>
-              <a:rPr lang="en-IN" dirty="0">
-                <a:solidFill>
-                  <a:srgbClr val="313131"/>
-                </a:solidFill>
-                <a:effectLst/>
-                <a:latin typeface="Helvetica" pitchFamily="2" charset="0"/>
-              </a:rPr>
-              <a:t>and the professional world.</a:t>
-            </a:r>
-          </a:p>
-          <a:p>
-            <a:endParaRPr lang="en-US" dirty="0"/>
+            <a:pPr>
+              <a:buFont typeface="Arial" panose="020B0604020202020204" pitchFamily="34" charset="0"/>
+              <a:buChar char="•"/>
+            </a:pPr>
+            <a:r>
+              <a:rPr lang="en-US" dirty="0"/>
+              <a:t>Purpose: To create a centralized system for managing guest speaker submissions and approvals</a:t>
+            </a:r>
+          </a:p>
+          <a:p>
+            <a:pPr>
+              <a:buFont typeface="Arial" panose="020B0604020202020204" pitchFamily="34" charset="0"/>
+              <a:buChar char="•"/>
+            </a:pPr>
+            <a:r>
+              <a:rPr lang="en-US" dirty="0"/>
+              <a:t>Target Users: Faculty members, administrators, and potential guest speakers</a:t>
+            </a:r>
+          </a:p>
+          <a:p>
+            <a:pPr>
+              <a:buFont typeface="Arial" panose="020B0604020202020204" pitchFamily="34" charset="0"/>
+              <a:buChar char="•"/>
+            </a:pPr>
+            <a:r>
+              <a:rPr lang="en-US" dirty="0"/>
+              <a:t>Key Features: Speaker submission, admin approval process, user authentication</a:t>
+            </a:r>
+          </a:p>
+          <a:p>
+            <a:pPr>
+              <a:buFont typeface="Arial" panose="020B0604020202020204" pitchFamily="34" charset="0"/>
+              <a:buChar char="•"/>
+            </a:pPr>
+            <a:r>
+              <a:rPr lang="en-US" dirty="0"/>
+              <a:t>Technologies Used: </a:t>
+            </a:r>
+            <a:r>
+              <a:rPr lang="en-US" dirty="0" err="1"/>
+              <a:t>Next.js</a:t>
+            </a:r>
+            <a:r>
+              <a:rPr lang="en-US" dirty="0"/>
+              <a:t>, React, </a:t>
+            </a:r>
+            <a:r>
+              <a:rPr lang="en-US" dirty="0" err="1"/>
+              <a:t>Supabase</a:t>
+            </a:r>
+            <a:r>
+              <a:rPr lang="en-US" dirty="0"/>
+              <a:t>, Tailwind CSS</a:t>
+            </a:r>
+          </a:p>
+          <a:p>
+            <a:r>
+              <a:rPr lang="en-US" dirty="0"/>
+              <a:t>[Insert a screenshot of the project structure or architecture diagram]</a:t>
+            </a:r>
           </a:p>
         </p:txBody>
       </p:sp>
@@ -5562,8 +6283,34 @@
                 <a:effectLst/>
                 <a:latin typeface="Helvetica" pitchFamily="2" charset="0"/>
               </a:rPr>
-              <a:t>Use Cases</a:t>
-            </a:r>
+              <a:t>3. User Roles and Workflows</a:t>
+            </a:r>
+            <a:br>
+              <a:rPr lang="en-IN" dirty="0">
+                <a:solidFill>
+                  <a:schemeClr val="accent2"/>
+                </a:solidFill>
+                <a:effectLst/>
+                <a:latin typeface="Helvetica" pitchFamily="2" charset="0"/>
+              </a:rPr>
+            </a:br>
+            <a:r>
+              <a:rPr lang="en-IN" sz="2400" dirty="0">
+                <a:solidFill>
+                  <a:schemeClr val="accent2"/>
+                </a:solidFill>
+                <a:effectLst/>
+                <a:latin typeface="Helvetica" pitchFamily="2" charset="0"/>
+              </a:rPr>
+              <a:t>3.1 Faculty Members</a:t>
+            </a:r>
+            <a:endParaRPr lang="en-IN" dirty="0">
+              <a:solidFill>
+                <a:schemeClr val="accent2"/>
+              </a:solidFill>
+              <a:effectLst/>
+              <a:latin typeface="Helvetica" pitchFamily="2" charset="0"/>
+            </a:endParaRPr>
           </a:p>
         </p:txBody>
       </p:sp>
@@ -5586,10 +6333,14 @@
         <p:spPr/>
         <p:txBody>
           <a:bodyPr>
-            <a:normAutofit fontScale="92500" lnSpcReduction="10000"/>
+            <a:normAutofit/>
           </a:bodyPr>
           <a:lstStyle/>
           <a:p>
+            <a:pPr>
+              <a:buFont typeface="Arial" panose="020B0604020202020204" pitchFamily="34" charset="0"/>
+              <a:buChar char="•"/>
+            </a:pPr>
             <a:r>
               <a:rPr lang="en-IN" dirty="0">
                 <a:solidFill>
@@ -5598,10 +6349,14 @@
                 <a:effectLst/>
                 <a:latin typeface="Helvetica" pitchFamily="2" charset="0"/>
               </a:rPr>
-              <a:t>1. Academic Seminars: Suggest and select</a:t>
-            </a:r>
-          </a:p>
-          <a:p>
+              <a:t>Submit potential speakers</a:t>
+            </a:r>
+          </a:p>
+          <a:p>
+            <a:pPr>
+              <a:buFont typeface="Arial" panose="020B0604020202020204" pitchFamily="34" charset="0"/>
+              <a:buChar char="•"/>
+            </a:pPr>
             <a:r>
               <a:rPr lang="en-IN" dirty="0">
                 <a:solidFill>
@@ -5610,10 +6365,14 @@
                 <a:effectLst/>
                 <a:latin typeface="Helvetica" pitchFamily="2" charset="0"/>
               </a:rPr>
-              <a:t>guest lecturers in fields like</a:t>
-            </a:r>
-          </a:p>
-          <a:p>
+              <a:t>View submission status</a:t>
+            </a:r>
+          </a:p>
+          <a:p>
+            <a:pPr>
+              <a:buFont typeface="Arial" panose="020B0604020202020204" pitchFamily="34" charset="0"/>
+              <a:buChar char="•"/>
+            </a:pPr>
             <a:r>
               <a:rPr lang="en-IN" dirty="0">
                 <a:solidFill>
@@ -5622,91 +6381,7 @@
                 <a:effectLst/>
                 <a:latin typeface="Helvetica" pitchFamily="2" charset="0"/>
               </a:rPr>
-              <a:t>cybersecurity, AI, and biotech.</a:t>
-            </a:r>
-          </a:p>
-          <a:p>
-            <a:r>
-              <a:rPr lang="en-IN" dirty="0">
-                <a:solidFill>
-                  <a:srgbClr val="313131"/>
-                </a:solidFill>
-                <a:effectLst/>
-                <a:latin typeface="Helvetica" pitchFamily="2" charset="0"/>
-              </a:rPr>
-              <a:t>2. Career Talks: Invite professionals to</a:t>
-            </a:r>
-          </a:p>
-          <a:p>
-            <a:r>
-              <a:rPr lang="en-IN" dirty="0">
-                <a:solidFill>
-                  <a:srgbClr val="313131"/>
-                </a:solidFill>
-                <a:effectLst/>
-                <a:latin typeface="Helvetica" pitchFamily="2" charset="0"/>
-              </a:rPr>
-              <a:t>share insights on specific industries and</a:t>
-            </a:r>
-          </a:p>
-          <a:p>
-            <a:r>
-              <a:rPr lang="en-IN" dirty="0">
-                <a:solidFill>
-                  <a:srgbClr val="313131"/>
-                </a:solidFill>
-                <a:effectLst/>
-                <a:latin typeface="Helvetica" pitchFamily="2" charset="0"/>
-              </a:rPr>
-              <a:t>career paths.</a:t>
-            </a:r>
-          </a:p>
-          <a:p>
-            <a:r>
-              <a:rPr lang="en-IN" dirty="0">
-                <a:solidFill>
-                  <a:srgbClr val="313131"/>
-                </a:solidFill>
-                <a:effectLst/>
-                <a:latin typeface="Helvetica" pitchFamily="2" charset="0"/>
-              </a:rPr>
-              <a:t>3. Special Workshops: Organize skill-</a:t>
-            </a:r>
-          </a:p>
-          <a:p>
-            <a:r>
-              <a:rPr lang="en-IN" dirty="0">
-                <a:solidFill>
-                  <a:srgbClr val="313131"/>
-                </a:solidFill>
-                <a:effectLst/>
-                <a:latin typeface="Helvetica" pitchFamily="2" charset="0"/>
-              </a:rPr>
-              <a:t>building sessions led by experienced</a:t>
-            </a:r>
-          </a:p>
-          <a:p>
-            <a:r>
-              <a:rPr lang="en-IN" dirty="0">
-                <a:solidFill>
-                  <a:srgbClr val="313131"/>
-                </a:solidFill>
-                <a:effectLst/>
-                <a:latin typeface="Helvetica" pitchFamily="2" charset="0"/>
-              </a:rPr>
-              <a:t>professionals (e.g., entrepreneurship,</a:t>
-            </a:r>
-          </a:p>
-          <a:p>
-            <a:r>
-              <a:rPr lang="en-IN" dirty="0">
-                <a:solidFill>
-                  <a:srgbClr val="313131"/>
-                </a:solidFill>
-                <a:effectLst/>
-                <a:latin typeface="Helvetica" pitchFamily="2" charset="0"/>
-              </a:rPr>
-              <a:t>digital marketing).</a:t>
+              <a:t>Access a database of approved speakers</a:t>
             </a:r>
           </a:p>
         </p:txBody>
@@ -5782,6 +6457,336 @@
 </file>
 
 <file path=ppt/slides/slide5.xml><?xml version="1.0" encoding="utf-8"?>
+<p:sld xmlns:a="http://schemas.openxmlformats.org/drawingml/2006/main" xmlns:r="http://schemas.openxmlformats.org/officeDocument/2006/relationships" xmlns:p="http://schemas.openxmlformats.org/presentationml/2006/main">
+  <p:cSld>
+    <p:spTree>
+      <p:nvGrpSpPr>
+        <p:cNvPr id="1" name=""/>
+        <p:cNvGrpSpPr/>
+        <p:nvPr/>
+      </p:nvGrpSpPr>
+      <p:grpSpPr>
+        <a:xfrm>
+          <a:off x="0" y="0"/>
+          <a:ext cx="0" cy="0"/>
+          <a:chOff x="0" y="0"/>
+          <a:chExt cx="0" cy="0"/>
+        </a:xfrm>
+      </p:grpSpPr>
+      <p:sp>
+        <p:nvSpPr>
+          <p:cNvPr id="2" name="Title 1">
+            <a:extLst>
+              <a:ext uri="{FF2B5EF4-FFF2-40B4-BE49-F238E27FC236}">
+                <a16:creationId xmlns:a16="http://schemas.microsoft.com/office/drawing/2014/main" id="{C5DC8870-A18D-2F99-983B-699F5350F115}"/>
+              </a:ext>
+            </a:extLst>
+          </p:cNvPr>
+          <p:cNvSpPr>
+            <a:spLocks noGrp="1"/>
+          </p:cNvSpPr>
+          <p:nvPr>
+            <p:ph type="title"/>
+          </p:nvPr>
+        </p:nvSpPr>
+        <p:spPr/>
+        <p:txBody>
+          <a:bodyPr/>
+          <a:lstStyle/>
+          <a:p>
+            <a:r>
+              <a:rPr lang="en-US" dirty="0"/>
+              <a:t>3.2 Administrators</a:t>
+            </a:r>
+          </a:p>
+        </p:txBody>
+      </p:sp>
+      <p:sp>
+        <p:nvSpPr>
+          <p:cNvPr id="3" name="Content Placeholder 2">
+            <a:extLst>
+              <a:ext uri="{FF2B5EF4-FFF2-40B4-BE49-F238E27FC236}">
+                <a16:creationId xmlns:a16="http://schemas.microsoft.com/office/drawing/2014/main" id="{AB7CFA61-4F78-D5DC-C511-3FC68831BD1B}"/>
+              </a:ext>
+            </a:extLst>
+          </p:cNvPr>
+          <p:cNvSpPr>
+            <a:spLocks noGrp="1"/>
+          </p:cNvSpPr>
+          <p:nvPr>
+            <p:ph idx="1"/>
+          </p:nvPr>
+        </p:nvSpPr>
+        <p:spPr/>
+        <p:txBody>
+          <a:bodyPr/>
+          <a:lstStyle/>
+          <a:p>
+            <a:pPr>
+              <a:buFont typeface="Arial" panose="020B0604020202020204" pitchFamily="34" charset="0"/>
+              <a:buChar char="•"/>
+            </a:pPr>
+            <a:r>
+              <a:rPr lang="en-US" dirty="0"/>
+              <a:t>Review and approve/reject speaker submissions</a:t>
+            </a:r>
+          </a:p>
+          <a:p>
+            <a:pPr>
+              <a:buFont typeface="Arial" panose="020B0604020202020204" pitchFamily="34" charset="0"/>
+              <a:buChar char="•"/>
+            </a:pPr>
+            <a:r>
+              <a:rPr lang="en-US" dirty="0"/>
+              <a:t>Manage the speaker database</a:t>
+            </a:r>
+          </a:p>
+          <a:p>
+            <a:pPr>
+              <a:buFont typeface="Arial" panose="020B0604020202020204" pitchFamily="34" charset="0"/>
+              <a:buChar char="•"/>
+            </a:pPr>
+            <a:r>
+              <a:rPr lang="en-US" dirty="0"/>
+              <a:t>Override submission statuses if necessary</a:t>
+            </a:r>
+          </a:p>
+        </p:txBody>
+      </p:sp>
+      <p:sp>
+        <p:nvSpPr>
+          <p:cNvPr id="4" name="Footer Placeholder 3">
+            <a:extLst>
+              <a:ext uri="{FF2B5EF4-FFF2-40B4-BE49-F238E27FC236}">
+                <a16:creationId xmlns:a16="http://schemas.microsoft.com/office/drawing/2014/main" id="{05997FC9-42FD-4F24-FAA5-D4EABE27651F}"/>
+              </a:ext>
+            </a:extLst>
+          </p:cNvPr>
+          <p:cNvSpPr>
+            <a:spLocks noGrp="1"/>
+          </p:cNvSpPr>
+          <p:nvPr>
+            <p:ph type="ftr" sz="quarter" idx="11"/>
+          </p:nvPr>
+        </p:nvSpPr>
+        <p:spPr/>
+        <p:txBody>
+          <a:bodyPr/>
+          <a:lstStyle/>
+          <a:p>
+            <a:r>
+              <a:rPr lang="en-US"/>
+              <a:t>Department of Computer Science &amp; Engineering ,CSPIT</a:t>
+            </a:r>
+          </a:p>
+        </p:txBody>
+      </p:sp>
+      <p:sp>
+        <p:nvSpPr>
+          <p:cNvPr id="5" name="Slide Number Placeholder 4">
+            <a:extLst>
+              <a:ext uri="{FF2B5EF4-FFF2-40B4-BE49-F238E27FC236}">
+                <a16:creationId xmlns:a16="http://schemas.microsoft.com/office/drawing/2014/main" id="{B2657E72-1941-89E2-20DC-AEFB9897BBA1}"/>
+              </a:ext>
+            </a:extLst>
+          </p:cNvPr>
+          <p:cNvSpPr>
+            <a:spLocks noGrp="1"/>
+          </p:cNvSpPr>
+          <p:nvPr>
+            <p:ph type="sldNum" sz="quarter" idx="12"/>
+          </p:nvPr>
+        </p:nvSpPr>
+        <p:spPr/>
+        <p:txBody>
+          <a:bodyPr/>
+          <a:lstStyle/>
+          <a:p>
+            <a:fld id="{252F294B-B6A8-44F3-8A3C-0EE5B1E3450E}" type="slidenum">
+              <a:rPr lang="en-US" smtClean="0"/>
+              <a:t>5</a:t>
+            </a:fld>
+            <a:endParaRPr lang="en-US"/>
+          </a:p>
+        </p:txBody>
+      </p:sp>
+    </p:spTree>
+    <p:extLst>
+      <p:ext uri="{BB962C8B-B14F-4D97-AF65-F5344CB8AC3E}">
+        <p14:creationId xmlns:p14="http://schemas.microsoft.com/office/powerpoint/2010/main" val="4194436986"/>
+      </p:ext>
+    </p:extLst>
+  </p:cSld>
+  <p:clrMapOvr>
+    <a:masterClrMapping/>
+  </p:clrMapOvr>
+</p:sld>
+</file>
+
+<file path=ppt/slides/slide6.xml><?xml version="1.0" encoding="utf-8"?>
+<p:sld xmlns:a="http://schemas.openxmlformats.org/drawingml/2006/main" xmlns:r="http://schemas.openxmlformats.org/officeDocument/2006/relationships" xmlns:p="http://schemas.openxmlformats.org/presentationml/2006/main">
+  <p:cSld>
+    <p:spTree>
+      <p:nvGrpSpPr>
+        <p:cNvPr id="1" name=""/>
+        <p:cNvGrpSpPr/>
+        <p:nvPr/>
+      </p:nvGrpSpPr>
+      <p:grpSpPr>
+        <a:xfrm>
+          <a:off x="0" y="0"/>
+          <a:ext cx="0" cy="0"/>
+          <a:chOff x="0" y="0"/>
+          <a:chExt cx="0" cy="0"/>
+        </a:xfrm>
+      </p:grpSpPr>
+      <p:sp>
+        <p:nvSpPr>
+          <p:cNvPr id="2" name="Title 1">
+            <a:extLst>
+              <a:ext uri="{FF2B5EF4-FFF2-40B4-BE49-F238E27FC236}">
+                <a16:creationId xmlns:a16="http://schemas.microsoft.com/office/drawing/2014/main" id="{05DE0573-B2A2-3026-F37B-3177367F40A0}"/>
+              </a:ext>
+            </a:extLst>
+          </p:cNvPr>
+          <p:cNvSpPr>
+            <a:spLocks noGrp="1"/>
+          </p:cNvSpPr>
+          <p:nvPr>
+            <p:ph type="title"/>
+          </p:nvPr>
+        </p:nvSpPr>
+        <p:spPr/>
+        <p:txBody>
+          <a:bodyPr/>
+          <a:lstStyle/>
+          <a:p>
+            <a:r>
+              <a:rPr lang="en-US" dirty="0"/>
+              <a:t>3.3 Guest Speakers (Indirect Users)</a:t>
+            </a:r>
+          </a:p>
+        </p:txBody>
+      </p:sp>
+      <p:sp>
+        <p:nvSpPr>
+          <p:cNvPr id="3" name="Content Placeholder 2">
+            <a:extLst>
+              <a:ext uri="{FF2B5EF4-FFF2-40B4-BE49-F238E27FC236}">
+                <a16:creationId xmlns:a16="http://schemas.microsoft.com/office/drawing/2014/main" id="{EE84C36E-F768-8052-F8E0-6118E3A18574}"/>
+              </a:ext>
+            </a:extLst>
+          </p:cNvPr>
+          <p:cNvSpPr>
+            <a:spLocks noGrp="1"/>
+          </p:cNvSpPr>
+          <p:nvPr>
+            <p:ph idx="1"/>
+          </p:nvPr>
+        </p:nvSpPr>
+        <p:spPr/>
+        <p:txBody>
+          <a:bodyPr/>
+          <a:lstStyle/>
+          <a:p>
+            <a:pPr>
+              <a:buFont typeface="Arial" panose="020B0604020202020204" pitchFamily="34" charset="0"/>
+              <a:buChar char="•"/>
+            </a:pPr>
+            <a:r>
+              <a:rPr lang="en-US" dirty="0"/>
+              <a:t>Potential to be added to the speaker database</a:t>
+            </a:r>
+          </a:p>
+          <a:p>
+            <a:pPr>
+              <a:buFont typeface="Arial" panose="020B0604020202020204" pitchFamily="34" charset="0"/>
+              <a:buChar char="•"/>
+            </a:pPr>
+            <a:r>
+              <a:rPr lang="en-US" dirty="0"/>
+              <a:t>Increased visibility in academic circles</a:t>
+            </a:r>
+          </a:p>
+          <a:p>
+            <a:r>
+              <a:rPr lang="en-US" dirty="0"/>
+              <a:t>[Insert screenshots of the faculty submission page and admin dashboard]</a:t>
+            </a:r>
+          </a:p>
+        </p:txBody>
+      </p:sp>
+      <p:sp>
+        <p:nvSpPr>
+          <p:cNvPr id="4" name="Footer Placeholder 3">
+            <a:extLst>
+              <a:ext uri="{FF2B5EF4-FFF2-40B4-BE49-F238E27FC236}">
+                <a16:creationId xmlns:a16="http://schemas.microsoft.com/office/drawing/2014/main" id="{814C0FE3-9083-50CF-E883-1D92FDDC4B8D}"/>
+              </a:ext>
+            </a:extLst>
+          </p:cNvPr>
+          <p:cNvSpPr>
+            <a:spLocks noGrp="1"/>
+          </p:cNvSpPr>
+          <p:nvPr>
+            <p:ph type="ftr" sz="quarter" idx="11"/>
+          </p:nvPr>
+        </p:nvSpPr>
+        <p:spPr/>
+        <p:txBody>
+          <a:bodyPr/>
+          <a:lstStyle/>
+          <a:p>
+            <a:r>
+              <a:rPr lang="en-US"/>
+              <a:t>Department of Computer Science &amp; Engineering ,CSPIT</a:t>
+            </a:r>
+          </a:p>
+        </p:txBody>
+      </p:sp>
+      <p:sp>
+        <p:nvSpPr>
+          <p:cNvPr id="5" name="Slide Number Placeholder 4">
+            <a:extLst>
+              <a:ext uri="{FF2B5EF4-FFF2-40B4-BE49-F238E27FC236}">
+                <a16:creationId xmlns:a16="http://schemas.microsoft.com/office/drawing/2014/main" id="{6BCDAFB9-BD2F-D1C3-59C4-D6D3759831EC}"/>
+              </a:ext>
+            </a:extLst>
+          </p:cNvPr>
+          <p:cNvSpPr>
+            <a:spLocks noGrp="1"/>
+          </p:cNvSpPr>
+          <p:nvPr>
+            <p:ph type="sldNum" sz="quarter" idx="12"/>
+          </p:nvPr>
+        </p:nvSpPr>
+        <p:spPr/>
+        <p:txBody>
+          <a:bodyPr/>
+          <a:lstStyle/>
+          <a:p>
+            <a:fld id="{252F294B-B6A8-44F3-8A3C-0EE5B1E3450E}" type="slidenum">
+              <a:rPr lang="en-US" smtClean="0"/>
+              <a:t>6</a:t>
+            </a:fld>
+            <a:endParaRPr lang="en-US"/>
+          </a:p>
+        </p:txBody>
+      </p:sp>
+    </p:spTree>
+    <p:extLst>
+      <p:ext uri="{BB962C8B-B14F-4D97-AF65-F5344CB8AC3E}">
+        <p14:creationId xmlns:p14="http://schemas.microsoft.com/office/powerpoint/2010/main" val="942335139"/>
+      </p:ext>
+    </p:extLst>
+  </p:cSld>
+  <p:clrMapOvr>
+    <a:masterClrMapping/>
+  </p:clrMapOvr>
+</p:sld>
+</file>
+
+<file path=ppt/slides/slide7.xml><?xml version="1.0" encoding="utf-8"?>
 <p:sld xmlns:a="http://schemas.openxmlformats.org/drawingml/2006/main" xmlns:r="http://schemas.openxmlformats.org/officeDocument/2006/relationships" xmlns:p="http://schemas.openxmlformats.org/presentationml/2006/main">
   <p:cSld>
     <p:spTree>
@@ -5835,8 +6840,34 @@
                 <a:effectLst/>
                 <a:latin typeface="Helvetica" pitchFamily="2" charset="0"/>
               </a:rPr>
-              <a:t>Applications in Universities</a:t>
-            </a:r>
+              <a:t>4. Technical Implementation</a:t>
+            </a:r>
+            <a:br>
+              <a:rPr lang="en-IN" dirty="0">
+                <a:solidFill>
+                  <a:schemeClr val="accent2"/>
+                </a:solidFill>
+                <a:effectLst/>
+                <a:latin typeface="Helvetica" pitchFamily="2" charset="0"/>
+              </a:rPr>
+            </a:br>
+            <a:r>
+              <a:rPr lang="en-IN" sz="2000" dirty="0">
+                <a:solidFill>
+                  <a:schemeClr val="accent2"/>
+                </a:solidFill>
+                <a:effectLst/>
+                <a:latin typeface="Helvetica" pitchFamily="2" charset="0"/>
+              </a:rPr>
+              <a:t>4.1 Frontend</a:t>
+            </a:r>
+            <a:endParaRPr lang="en-IN" dirty="0">
+              <a:solidFill>
+                <a:schemeClr val="accent2"/>
+              </a:solidFill>
+              <a:effectLst/>
+              <a:latin typeface="Helvetica" pitchFamily="2" charset="0"/>
+            </a:endParaRPr>
           </a:p>
         </p:txBody>
       </p:sp>
@@ -6023,7 +7054,7 @@
           <a:p>
             <a:fld id="{252F294B-B6A8-44F3-8A3C-0EE5B1E3450E}" type="slidenum">
               <a:rPr lang="en-US" smtClean="0"/>
-              <a:t>5</a:t>
+              <a:t>7</a:t>
             </a:fld>
             <a:endParaRPr lang="en-US"/>
           </a:p>
@@ -6033,504 +7064,6 @@
     <p:extLst>
       <p:ext uri="{BB962C8B-B14F-4D97-AF65-F5344CB8AC3E}">
         <p14:creationId xmlns:p14="http://schemas.microsoft.com/office/powerpoint/2010/main" val="2663670644"/>
-      </p:ext>
-    </p:extLst>
-  </p:cSld>
-  <p:clrMapOvr>
-    <a:masterClrMapping/>
-  </p:clrMapOvr>
-</p:sld>
-</file>
-
-<file path=ppt/slides/slide6.xml><?xml version="1.0" encoding="utf-8"?>
-<p:sld xmlns:a="http://schemas.openxmlformats.org/drawingml/2006/main" xmlns:r="http://schemas.openxmlformats.org/officeDocument/2006/relationships" xmlns:p="http://schemas.openxmlformats.org/presentationml/2006/main">
-  <p:cSld>
-    <p:spTree>
-      <p:nvGrpSpPr>
-        <p:cNvPr id="1" name="">
-          <a:extLst>
-            <a:ext uri="{FF2B5EF4-FFF2-40B4-BE49-F238E27FC236}">
-              <a16:creationId xmlns:a16="http://schemas.microsoft.com/office/drawing/2014/main" id="{C0230104-1E37-EECC-ED6D-12C761CB9122}"/>
-            </a:ext>
-          </a:extLst>
-        </p:cNvPr>
-        <p:cNvGrpSpPr/>
-        <p:nvPr/>
-      </p:nvGrpSpPr>
-      <p:grpSpPr>
-        <a:xfrm>
-          <a:off x="0" y="0"/>
-          <a:ext cx="0" cy="0"/>
-          <a:chOff x="0" y="0"/>
-          <a:chExt cx="0" cy="0"/>
-        </a:xfrm>
-      </p:grpSpPr>
-      <p:sp>
-        <p:nvSpPr>
-          <p:cNvPr id="2" name="Title 1">
-            <a:extLst>
-              <a:ext uri="{FF2B5EF4-FFF2-40B4-BE49-F238E27FC236}">
-                <a16:creationId xmlns:a16="http://schemas.microsoft.com/office/drawing/2014/main" id="{6B0CDDBD-C4B0-F5CA-EF06-BC5F7C7E0790}"/>
-              </a:ext>
-            </a:extLst>
-          </p:cNvPr>
-          <p:cNvSpPr>
-            <a:spLocks noGrp="1"/>
-          </p:cNvSpPr>
-          <p:nvPr>
-            <p:ph type="title"/>
-          </p:nvPr>
-        </p:nvSpPr>
-        <p:spPr/>
-        <p:txBody>
-          <a:bodyPr>
-            <a:normAutofit/>
-          </a:bodyPr>
-          <a:lstStyle/>
-          <a:p>
-            <a:r>
-              <a:rPr lang="en-IN" dirty="0">
-                <a:solidFill>
-                  <a:schemeClr val="accent2"/>
-                </a:solidFill>
-                <a:effectLst/>
-                <a:latin typeface="Helvetica" pitchFamily="2" charset="0"/>
-              </a:rPr>
-              <a:t>Key Website Features</a:t>
-            </a:r>
-          </a:p>
-        </p:txBody>
-      </p:sp>
-      <p:sp>
-        <p:nvSpPr>
-          <p:cNvPr id="3" name="Content Placeholder 2">
-            <a:extLst>
-              <a:ext uri="{FF2B5EF4-FFF2-40B4-BE49-F238E27FC236}">
-                <a16:creationId xmlns:a16="http://schemas.microsoft.com/office/drawing/2014/main" id="{C2F691DE-4599-9534-3204-9926F19B6520}"/>
-              </a:ext>
-            </a:extLst>
-          </p:cNvPr>
-          <p:cNvSpPr>
-            <a:spLocks noGrp="1"/>
-          </p:cNvSpPr>
-          <p:nvPr>
-            <p:ph idx="1"/>
-          </p:nvPr>
-        </p:nvSpPr>
-        <p:spPr/>
-        <p:txBody>
-          <a:bodyPr>
-            <a:normAutofit/>
-          </a:bodyPr>
-          <a:lstStyle/>
-          <a:p>
-            <a:r>
-              <a:rPr lang="en-IN" dirty="0">
-                <a:solidFill>
-                  <a:srgbClr val="313131"/>
-                </a:solidFill>
-                <a:effectLst/>
-                <a:latin typeface="Helvetica" pitchFamily="2" charset="0"/>
-              </a:rPr>
-              <a:t>1. Speaker Suggestion Form: Simple,</a:t>
-            </a:r>
-          </a:p>
-          <a:p>
-            <a:r>
-              <a:rPr lang="en-IN" dirty="0">
-                <a:solidFill>
-                  <a:srgbClr val="313131"/>
-                </a:solidFill>
-                <a:effectLst/>
-                <a:latin typeface="Helvetica" pitchFamily="2" charset="0"/>
-              </a:rPr>
-              <a:t>user-friendly form for students to</a:t>
-            </a:r>
-          </a:p>
-          <a:p>
-            <a:r>
-              <a:rPr lang="en-IN" dirty="0">
-                <a:solidFill>
-                  <a:srgbClr val="313131"/>
-                </a:solidFill>
-                <a:effectLst/>
-                <a:latin typeface="Helvetica" pitchFamily="2" charset="0"/>
-              </a:rPr>
-              <a:t>recommend speakers.</a:t>
-            </a:r>
-          </a:p>
-          <a:p>
-            <a:r>
-              <a:rPr lang="en-IN" dirty="0">
-                <a:solidFill>
-                  <a:srgbClr val="313131"/>
-                </a:solidFill>
-                <a:effectLst/>
-                <a:latin typeface="Helvetica" pitchFamily="2" charset="0"/>
-              </a:rPr>
-              <a:t>2. Admin Panel: Admins can manage and</a:t>
-            </a:r>
-          </a:p>
-          <a:p>
-            <a:r>
-              <a:rPr lang="en-IN" dirty="0">
-                <a:solidFill>
-                  <a:srgbClr val="313131"/>
-                </a:solidFill>
-                <a:effectLst/>
-                <a:latin typeface="Helvetica" pitchFamily="2" charset="0"/>
-              </a:rPr>
-              <a:t>review submissions with ease.</a:t>
-            </a:r>
-          </a:p>
-          <a:p>
-            <a:r>
-              <a:rPr lang="en-IN" dirty="0">
-                <a:solidFill>
-                  <a:srgbClr val="313131"/>
-                </a:solidFill>
-                <a:effectLst/>
-                <a:latin typeface="Helvetica" pitchFamily="2" charset="0"/>
-              </a:rPr>
-              <a:t>3. Mobile-Responsive Design: Fully</a:t>
-            </a:r>
-          </a:p>
-          <a:p>
-            <a:r>
-              <a:rPr lang="en-IN" dirty="0">
-                <a:solidFill>
-                  <a:srgbClr val="313131"/>
-                </a:solidFill>
-                <a:effectLst/>
-                <a:latin typeface="Helvetica" pitchFamily="2" charset="0"/>
-              </a:rPr>
-              <a:t>optimized for both desktop and mobile</a:t>
-            </a:r>
-          </a:p>
-          <a:p>
-            <a:r>
-              <a:rPr lang="en-IN" dirty="0">
-                <a:solidFill>
-                  <a:srgbClr val="313131"/>
-                </a:solidFill>
-                <a:effectLst/>
-                <a:latin typeface="Helvetica" pitchFamily="2" charset="0"/>
-              </a:rPr>
-              <a:t>users.</a:t>
-            </a:r>
-          </a:p>
-        </p:txBody>
-      </p:sp>
-      <p:sp>
-        <p:nvSpPr>
-          <p:cNvPr id="4" name="Footer Placeholder 3">
-            <a:extLst>
-              <a:ext uri="{FF2B5EF4-FFF2-40B4-BE49-F238E27FC236}">
-                <a16:creationId xmlns:a16="http://schemas.microsoft.com/office/drawing/2014/main" id="{1F96F960-F827-DA15-344D-6CF403E610D8}"/>
-              </a:ext>
-            </a:extLst>
-          </p:cNvPr>
-          <p:cNvSpPr>
-            <a:spLocks noGrp="1"/>
-          </p:cNvSpPr>
-          <p:nvPr>
-            <p:ph type="ftr" sz="quarter" idx="11"/>
-          </p:nvPr>
-        </p:nvSpPr>
-        <p:spPr/>
-        <p:txBody>
-          <a:bodyPr/>
-          <a:lstStyle/>
-          <a:p>
-            <a:r>
-              <a:rPr lang="en-US"/>
-              <a:t>Department of Computer Science &amp; Engineering ,CSPIT</a:t>
-            </a:r>
-          </a:p>
-        </p:txBody>
-      </p:sp>
-      <p:sp>
-        <p:nvSpPr>
-          <p:cNvPr id="5" name="Slide Number Placeholder 4">
-            <a:extLst>
-              <a:ext uri="{FF2B5EF4-FFF2-40B4-BE49-F238E27FC236}">
-                <a16:creationId xmlns:a16="http://schemas.microsoft.com/office/drawing/2014/main" id="{FEBB0FB4-B0C5-09AA-FEA1-7DC249AC8FC2}"/>
-              </a:ext>
-            </a:extLst>
-          </p:cNvPr>
-          <p:cNvSpPr>
-            <a:spLocks noGrp="1"/>
-          </p:cNvSpPr>
-          <p:nvPr>
-            <p:ph type="sldNum" sz="quarter" idx="12"/>
-          </p:nvPr>
-        </p:nvSpPr>
-        <p:spPr/>
-        <p:txBody>
-          <a:bodyPr/>
-          <a:lstStyle/>
-          <a:p>
-            <a:fld id="{252F294B-B6A8-44F3-8A3C-0EE5B1E3450E}" type="slidenum">
-              <a:rPr lang="en-US" smtClean="0"/>
-              <a:t>6</a:t>
-            </a:fld>
-            <a:endParaRPr lang="en-US"/>
-          </a:p>
-        </p:txBody>
-      </p:sp>
-    </p:spTree>
-    <p:extLst>
-      <p:ext uri="{BB962C8B-B14F-4D97-AF65-F5344CB8AC3E}">
-        <p14:creationId xmlns:p14="http://schemas.microsoft.com/office/powerpoint/2010/main" val="3112544591"/>
-      </p:ext>
-    </p:extLst>
-  </p:cSld>
-  <p:clrMapOvr>
-    <a:masterClrMapping/>
-  </p:clrMapOvr>
-</p:sld>
-</file>
-
-<file path=ppt/slides/slide7.xml><?xml version="1.0" encoding="utf-8"?>
-<p:sld xmlns:a="http://schemas.openxmlformats.org/drawingml/2006/main" xmlns:r="http://schemas.openxmlformats.org/officeDocument/2006/relationships" xmlns:p="http://schemas.openxmlformats.org/presentationml/2006/main">
-  <p:cSld>
-    <p:spTree>
-      <p:nvGrpSpPr>
-        <p:cNvPr id="1" name="">
-          <a:extLst>
-            <a:ext uri="{FF2B5EF4-FFF2-40B4-BE49-F238E27FC236}">
-              <a16:creationId xmlns:a16="http://schemas.microsoft.com/office/drawing/2014/main" id="{29DD08A8-8FC8-4431-B453-F74C9F214021}"/>
-            </a:ext>
-          </a:extLst>
-        </p:cNvPr>
-        <p:cNvGrpSpPr/>
-        <p:nvPr/>
-      </p:nvGrpSpPr>
-      <p:grpSpPr>
-        <a:xfrm>
-          <a:off x="0" y="0"/>
-          <a:ext cx="0" cy="0"/>
-          <a:chOff x="0" y="0"/>
-          <a:chExt cx="0" cy="0"/>
-        </a:xfrm>
-      </p:grpSpPr>
-      <p:sp>
-        <p:nvSpPr>
-          <p:cNvPr id="2" name="Title 1">
-            <a:extLst>
-              <a:ext uri="{FF2B5EF4-FFF2-40B4-BE49-F238E27FC236}">
-                <a16:creationId xmlns:a16="http://schemas.microsoft.com/office/drawing/2014/main" id="{D0B46626-2BD7-D88A-5FC7-63E8C517854D}"/>
-              </a:ext>
-            </a:extLst>
-          </p:cNvPr>
-          <p:cNvSpPr>
-            <a:spLocks noGrp="1"/>
-          </p:cNvSpPr>
-          <p:nvPr>
-            <p:ph type="title"/>
-          </p:nvPr>
-        </p:nvSpPr>
-        <p:spPr/>
-        <p:txBody>
-          <a:bodyPr>
-            <a:normAutofit/>
-          </a:bodyPr>
-          <a:lstStyle/>
-          <a:p>
-            <a:r>
-              <a:rPr lang="en-IN" dirty="0">
-                <a:solidFill>
-                  <a:schemeClr val="accent2"/>
-                </a:solidFill>
-                <a:effectLst/>
-                <a:latin typeface="Helvetica" pitchFamily="2" charset="0"/>
-              </a:rPr>
-              <a:t>Speaker Suggestion Form</a:t>
-            </a:r>
-          </a:p>
-        </p:txBody>
-      </p:sp>
-      <p:sp>
-        <p:nvSpPr>
-          <p:cNvPr id="3" name="Content Placeholder 2">
-            <a:extLst>
-              <a:ext uri="{FF2B5EF4-FFF2-40B4-BE49-F238E27FC236}">
-                <a16:creationId xmlns:a16="http://schemas.microsoft.com/office/drawing/2014/main" id="{8CAE07D5-F745-34A0-53F3-7DC9B295FF8F}"/>
-              </a:ext>
-            </a:extLst>
-          </p:cNvPr>
-          <p:cNvSpPr>
-            <a:spLocks noGrp="1"/>
-          </p:cNvSpPr>
-          <p:nvPr>
-            <p:ph idx="1"/>
-          </p:nvPr>
-        </p:nvSpPr>
-        <p:spPr/>
-        <p:txBody>
-          <a:bodyPr>
-            <a:normAutofit/>
-          </a:bodyPr>
-          <a:lstStyle/>
-          <a:p>
-            <a:r>
-              <a:rPr lang="en-IN" dirty="0">
-                <a:solidFill>
-                  <a:srgbClr val="313131"/>
-                </a:solidFill>
-                <a:effectLst/>
-                <a:latin typeface="Helvetica" pitchFamily="2" charset="0"/>
-              </a:rPr>
-              <a:t>The form captures all necessary details</a:t>
-            </a:r>
-          </a:p>
-          <a:p>
-            <a:r>
-              <a:rPr lang="en-IN" dirty="0">
-                <a:solidFill>
-                  <a:srgbClr val="313131"/>
-                </a:solidFill>
-                <a:effectLst/>
-                <a:latin typeface="Helvetica" pitchFamily="2" charset="0"/>
-              </a:rPr>
-              <a:t>for evaluating speaker submissions. Form</a:t>
-            </a:r>
-          </a:p>
-          <a:p>
-            <a:r>
-              <a:rPr lang="en-IN" dirty="0">
-                <a:solidFill>
-                  <a:srgbClr val="313131"/>
-                </a:solidFill>
-                <a:effectLst/>
-                <a:latin typeface="Helvetica" pitchFamily="2" charset="0"/>
-              </a:rPr>
-              <a:t>fields include:</a:t>
-            </a:r>
-          </a:p>
-          <a:p>
-            <a:r>
-              <a:rPr lang="en-IN" dirty="0">
-                <a:solidFill>
-                  <a:srgbClr val="313131"/>
-                </a:solidFill>
-                <a:effectLst/>
-                <a:latin typeface="Helvetica" pitchFamily="2" charset="0"/>
-              </a:rPr>
-              <a:t>- Speaker Name</a:t>
-            </a:r>
-          </a:p>
-          <a:p>
-            <a:r>
-              <a:rPr lang="en-IN" dirty="0">
-                <a:solidFill>
-                  <a:srgbClr val="313131"/>
-                </a:solidFill>
-                <a:effectLst/>
-                <a:latin typeface="Helvetica" pitchFamily="2" charset="0"/>
-              </a:rPr>
-              <a:t>- Field of Expertise</a:t>
-            </a:r>
-          </a:p>
-          <a:p>
-            <a:r>
-              <a:rPr lang="en-IN" dirty="0">
-                <a:solidFill>
-                  <a:srgbClr val="313131"/>
-                </a:solidFill>
-                <a:effectLst/>
-                <a:latin typeface="Helvetica" pitchFamily="2" charset="0"/>
-              </a:rPr>
-              <a:t>- Professional Background</a:t>
-            </a:r>
-          </a:p>
-          <a:p>
-            <a:r>
-              <a:rPr lang="en-IN" dirty="0">
-                <a:solidFill>
-                  <a:srgbClr val="313131"/>
-                </a:solidFill>
-                <a:effectLst/>
-                <a:latin typeface="Helvetica" pitchFamily="2" charset="0"/>
-              </a:rPr>
-              <a:t>- Why the speaker is recommended for a</a:t>
-            </a:r>
-          </a:p>
-          <a:p>
-            <a:r>
-              <a:rPr lang="en-IN" dirty="0">
-                <a:solidFill>
-                  <a:srgbClr val="313131"/>
-                </a:solidFill>
-                <a:effectLst/>
-                <a:latin typeface="Helvetica" pitchFamily="2" charset="0"/>
-              </a:rPr>
-              <a:t>seminar.</a:t>
-            </a:r>
-          </a:p>
-        </p:txBody>
-      </p:sp>
-      <p:sp>
-        <p:nvSpPr>
-          <p:cNvPr id="4" name="Footer Placeholder 3">
-            <a:extLst>
-              <a:ext uri="{FF2B5EF4-FFF2-40B4-BE49-F238E27FC236}">
-                <a16:creationId xmlns:a16="http://schemas.microsoft.com/office/drawing/2014/main" id="{4CA14248-4E3D-56C1-9D71-11C1DE39F3B6}"/>
-              </a:ext>
-            </a:extLst>
-          </p:cNvPr>
-          <p:cNvSpPr>
-            <a:spLocks noGrp="1"/>
-          </p:cNvSpPr>
-          <p:nvPr>
-            <p:ph type="ftr" sz="quarter" idx="11"/>
-          </p:nvPr>
-        </p:nvSpPr>
-        <p:spPr/>
-        <p:txBody>
-          <a:bodyPr/>
-          <a:lstStyle/>
-          <a:p>
-            <a:r>
-              <a:rPr lang="en-US"/>
-              <a:t>Department of Computer Science &amp; Engineering ,CSPIT</a:t>
-            </a:r>
-          </a:p>
-        </p:txBody>
-      </p:sp>
-      <p:sp>
-        <p:nvSpPr>
-          <p:cNvPr id="5" name="Slide Number Placeholder 4">
-            <a:extLst>
-              <a:ext uri="{FF2B5EF4-FFF2-40B4-BE49-F238E27FC236}">
-                <a16:creationId xmlns:a16="http://schemas.microsoft.com/office/drawing/2014/main" id="{E3358547-7D49-8318-A174-16C0940B9576}"/>
-              </a:ext>
-            </a:extLst>
-          </p:cNvPr>
-          <p:cNvSpPr>
-            <a:spLocks noGrp="1"/>
-          </p:cNvSpPr>
-          <p:nvPr>
-            <p:ph type="sldNum" sz="quarter" idx="12"/>
-          </p:nvPr>
-        </p:nvSpPr>
-        <p:spPr/>
-        <p:txBody>
-          <a:bodyPr/>
-          <a:lstStyle/>
-          <a:p>
-            <a:fld id="{252F294B-B6A8-44F3-8A3C-0EE5B1E3450E}" type="slidenum">
-              <a:rPr lang="en-US" smtClean="0"/>
-              <a:t>7</a:t>
-            </a:fld>
-            <a:endParaRPr lang="en-US"/>
-          </a:p>
-        </p:txBody>
-      </p:sp>
-    </p:spTree>
-    <p:extLst>
-      <p:ext uri="{BB962C8B-B14F-4D97-AF65-F5344CB8AC3E}">
-        <p14:creationId xmlns:p14="http://schemas.microsoft.com/office/powerpoint/2010/main" val="2573806196"/>
       </p:ext>
     </p:extLst>
   </p:cSld>
@@ -6545,13 +7078,7 @@
   <p:cSld>
     <p:spTree>
       <p:nvGrpSpPr>
-        <p:cNvPr id="1" name="">
-          <a:extLst>
-            <a:ext uri="{FF2B5EF4-FFF2-40B4-BE49-F238E27FC236}">
-              <a16:creationId xmlns:a16="http://schemas.microsoft.com/office/drawing/2014/main" id="{BF7F08B6-1818-B209-1F39-8CFC6154E6ED}"/>
-            </a:ext>
-          </a:extLst>
-        </p:cNvPr>
+        <p:cNvPr id="1" name=""/>
         <p:cNvGrpSpPr/>
         <p:nvPr/>
       </p:nvGrpSpPr>
@@ -6568,7 +7095,7 @@
           <p:cNvPr id="2" name="Title 1">
             <a:extLst>
               <a:ext uri="{FF2B5EF4-FFF2-40B4-BE49-F238E27FC236}">
-                <a16:creationId xmlns:a16="http://schemas.microsoft.com/office/drawing/2014/main" id="{24F08AF9-4BE9-E3EE-595C-93FBA96C3D6A}"/>
+                <a16:creationId xmlns:a16="http://schemas.microsoft.com/office/drawing/2014/main" id="{429A9787-A37D-697C-1FE8-740D8A1256A0}"/>
               </a:ext>
             </a:extLst>
           </p:cNvPr>
@@ -6581,20 +7108,12 @@
         </p:nvSpPr>
         <p:spPr/>
         <p:txBody>
-          <a:bodyPr>
-            <a:normAutofit/>
-          </a:bodyPr>
-          <a:lstStyle/>
-          <a:p>
-            <a:r>
-              <a:rPr lang="en-IN" dirty="0">
-                <a:solidFill>
-                  <a:schemeClr val="accent2"/>
-                </a:solidFill>
-                <a:effectLst/>
-                <a:latin typeface="Helvetica" pitchFamily="2" charset="0"/>
-              </a:rPr>
-              <a:t>Admin Dashboard</a:t>
+          <a:bodyPr/>
+          <a:lstStyle/>
+          <a:p>
+            <a:r>
+              <a:rPr lang="en-US" dirty="0"/>
+              <a:t>4.2 Backend</a:t>
             </a:r>
           </a:p>
         </p:txBody>
@@ -6604,7 +7123,7 @@
           <p:cNvPr id="3" name="Content Placeholder 2">
             <a:extLst>
               <a:ext uri="{FF2B5EF4-FFF2-40B4-BE49-F238E27FC236}">
-                <a16:creationId xmlns:a16="http://schemas.microsoft.com/office/drawing/2014/main" id="{814F871E-BE43-356C-90A3-B12934C01FEB}"/>
+                <a16:creationId xmlns:a16="http://schemas.microsoft.com/office/drawing/2014/main" id="{804D7B5E-4E67-B4FD-A3DD-3B9A43E09AC7}"/>
               </a:ext>
             </a:extLst>
           </p:cNvPr>
@@ -6617,104 +7136,40 @@
         </p:nvSpPr>
         <p:spPr/>
         <p:txBody>
-          <a:bodyPr>
-            <a:normAutofit/>
-          </a:bodyPr>
-          <a:lstStyle/>
-          <a:p>
-            <a:r>
-              <a:rPr lang="en-IN" dirty="0">
-                <a:solidFill>
-                  <a:srgbClr val="313131"/>
-                </a:solidFill>
-                <a:effectLst/>
-                <a:latin typeface="Helvetica" pitchFamily="2" charset="0"/>
-              </a:rPr>
-              <a:t>Admins can view and filter all speaker</a:t>
-            </a:r>
-          </a:p>
-          <a:p>
-            <a:r>
-              <a:rPr lang="en-IN" dirty="0">
-                <a:solidFill>
-                  <a:srgbClr val="313131"/>
-                </a:solidFill>
-                <a:effectLst/>
-                <a:latin typeface="Helvetica" pitchFamily="2" charset="0"/>
-              </a:rPr>
-              <a:t>submissions. Features include:</a:t>
-            </a:r>
-          </a:p>
-          <a:p>
-            <a:r>
-              <a:rPr lang="en-IN" dirty="0">
-                <a:solidFill>
-                  <a:srgbClr val="313131"/>
-                </a:solidFill>
-                <a:effectLst/>
-                <a:latin typeface="Helvetica" pitchFamily="2" charset="0"/>
-              </a:rPr>
-              <a:t>- View Submission Details: See full</a:t>
-            </a:r>
-          </a:p>
-          <a:p>
-            <a:r>
-              <a:rPr lang="en-IN" dirty="0">
-                <a:solidFill>
-                  <a:srgbClr val="313131"/>
-                </a:solidFill>
-                <a:effectLst/>
-                <a:latin typeface="Helvetica" pitchFamily="2" charset="0"/>
-              </a:rPr>
-              <a:t>information about each suggested</a:t>
-            </a:r>
-          </a:p>
-          <a:p>
-            <a:r>
-              <a:rPr lang="en-IN" dirty="0">
-                <a:solidFill>
-                  <a:srgbClr val="313131"/>
-                </a:solidFill>
-                <a:effectLst/>
-                <a:latin typeface="Helvetica" pitchFamily="2" charset="0"/>
-              </a:rPr>
-              <a:t>speaker.</a:t>
-            </a:r>
-          </a:p>
-          <a:p>
-            <a:r>
-              <a:rPr lang="en-IN" dirty="0">
-                <a:solidFill>
-                  <a:srgbClr val="313131"/>
-                </a:solidFill>
-                <a:effectLst/>
-                <a:latin typeface="Helvetica" pitchFamily="2" charset="0"/>
-              </a:rPr>
-              <a:t>- Accept or Reject Submissions: Admins</a:t>
-            </a:r>
-          </a:p>
-          <a:p>
-            <a:r>
-              <a:rPr lang="en-IN" dirty="0">
-                <a:solidFill>
-                  <a:srgbClr val="313131"/>
-                </a:solidFill>
-                <a:effectLst/>
-                <a:latin typeface="Helvetica" pitchFamily="2" charset="0"/>
-              </a:rPr>
-              <a:t>can decide which speakers are suitable for</a:t>
-            </a:r>
-          </a:p>
-          <a:p>
-            <a:r>
-              <a:rPr lang="en-IN" dirty="0">
-                <a:solidFill>
-                  <a:srgbClr val="313131"/>
-                </a:solidFill>
-                <a:effectLst/>
-                <a:latin typeface="Helvetica" pitchFamily="2" charset="0"/>
-              </a:rPr>
-              <a:t>the event.</a:t>
+          <a:bodyPr/>
+          <a:lstStyle/>
+          <a:p>
+            <a:pPr>
+              <a:buFont typeface="Arial" panose="020B0604020202020204" pitchFamily="34" charset="0"/>
+              <a:buChar char="•"/>
+            </a:pPr>
+            <a:r>
+              <a:rPr lang="en-US" dirty="0" err="1"/>
+              <a:t>Supabase</a:t>
+            </a:r>
+            <a:r>
+              <a:rPr lang="en-US" dirty="0"/>
+              <a:t> for database management and authentication</a:t>
+            </a:r>
+          </a:p>
+          <a:p>
+            <a:pPr>
+              <a:buFont typeface="Arial" panose="020B0604020202020204" pitchFamily="34" charset="0"/>
+              <a:buChar char="•"/>
+            </a:pPr>
+            <a:r>
+              <a:rPr lang="en-US" dirty="0"/>
+              <a:t>RESTful API endpoints for CRUD operations on speaker data</a:t>
+            </a:r>
+          </a:p>
+          <a:p>
+            <a:pPr>
+              <a:buFont typeface="Arial" panose="020B0604020202020204" pitchFamily="34" charset="0"/>
+              <a:buChar char="•"/>
+            </a:pPr>
+            <a:r>
+              <a:rPr lang="en-US" dirty="0"/>
+              <a:t>Serverless functions for business logic (if applicable)</a:t>
             </a:r>
           </a:p>
         </p:txBody>
@@ -6724,7 +7179,7 @@
           <p:cNvPr id="4" name="Footer Placeholder 3">
             <a:extLst>
               <a:ext uri="{FF2B5EF4-FFF2-40B4-BE49-F238E27FC236}">
-                <a16:creationId xmlns:a16="http://schemas.microsoft.com/office/drawing/2014/main" id="{1D424068-05BA-FA45-9A94-3B2F1C5EC5DC}"/>
+                <a16:creationId xmlns:a16="http://schemas.microsoft.com/office/drawing/2014/main" id="{F255E5E9-F482-170C-ACDF-6A631E89A037}"/>
               </a:ext>
             </a:extLst>
           </p:cNvPr>
@@ -6752,7 +7207,7 @@
           <p:cNvPr id="5" name="Slide Number Placeholder 4">
             <a:extLst>
               <a:ext uri="{FF2B5EF4-FFF2-40B4-BE49-F238E27FC236}">
-                <a16:creationId xmlns:a16="http://schemas.microsoft.com/office/drawing/2014/main" id="{6EFAFB62-CD33-EB2F-338B-8D8F4428214B}"/>
+                <a16:creationId xmlns:a16="http://schemas.microsoft.com/office/drawing/2014/main" id="{F8680C45-E73D-5250-91C2-A96A645DB22C}"/>
               </a:ext>
             </a:extLst>
           </p:cNvPr>
@@ -6779,7 +7234,7 @@
     </p:spTree>
     <p:extLst>
       <p:ext uri="{BB962C8B-B14F-4D97-AF65-F5344CB8AC3E}">
-        <p14:creationId xmlns:p14="http://schemas.microsoft.com/office/powerpoint/2010/main" val="1873383182"/>
+        <p14:creationId xmlns:p14="http://schemas.microsoft.com/office/powerpoint/2010/main" val="1631688109"/>
       </p:ext>
     </p:extLst>
   </p:cSld>
@@ -6794,13 +7249,7 @@
   <p:cSld>
     <p:spTree>
       <p:nvGrpSpPr>
-        <p:cNvPr id="1" name="">
-          <a:extLst>
-            <a:ext uri="{FF2B5EF4-FFF2-40B4-BE49-F238E27FC236}">
-              <a16:creationId xmlns:a16="http://schemas.microsoft.com/office/drawing/2014/main" id="{0F42FEC7-DD30-90A0-36A9-4C9D5FD0EC85}"/>
-            </a:ext>
-          </a:extLst>
-        </p:cNvPr>
+        <p:cNvPr id="1" name=""/>
         <p:cNvGrpSpPr/>
         <p:nvPr/>
       </p:nvGrpSpPr>
@@ -6817,7 +7266,7 @@
           <p:cNvPr id="2" name="Title 1">
             <a:extLst>
               <a:ext uri="{FF2B5EF4-FFF2-40B4-BE49-F238E27FC236}">
-                <a16:creationId xmlns:a16="http://schemas.microsoft.com/office/drawing/2014/main" id="{DDF2BB73-0F54-0EE0-A6EB-4DA6210F9BA2}"/>
+                <a16:creationId xmlns:a16="http://schemas.microsoft.com/office/drawing/2014/main" id="{0B594677-0950-1BF2-1C48-2B216745544E}"/>
               </a:ext>
             </a:extLst>
           </p:cNvPr>
@@ -6830,65 +7279,80 @@
         </p:nvSpPr>
         <p:spPr/>
         <p:txBody>
-          <a:bodyPr>
-            <a:normAutofit/>
-          </a:bodyPr>
-          <a:lstStyle/>
-          <a:p>
-            <a:r>
-              <a:rPr lang="en-IN" dirty="0">
-                <a:solidFill>
-                  <a:schemeClr val="accent2"/>
-                </a:solidFill>
-                <a:effectLst/>
-                <a:latin typeface="Helvetica" pitchFamily="2" charset="0"/>
-              </a:rPr>
-              <a:t>Workflow Diagram</a:t>
-            </a:r>
-          </a:p>
-        </p:txBody>
-      </p:sp>
-      <p:pic>
-        <p:nvPicPr>
-          <p:cNvPr id="7" name="Content Placeholder 6">
+          <a:bodyPr/>
+          <a:lstStyle/>
+          <a:p>
+            <a:r>
+              <a:rPr lang="en-US" dirty="0"/>
+              <a:t>4.3 Data Model</a:t>
+            </a:r>
+          </a:p>
+        </p:txBody>
+      </p:sp>
+      <p:sp>
+        <p:nvSpPr>
+          <p:cNvPr id="3" name="Content Placeholder 2">
             <a:extLst>
               <a:ext uri="{FF2B5EF4-FFF2-40B4-BE49-F238E27FC236}">
-                <a16:creationId xmlns:a16="http://schemas.microsoft.com/office/drawing/2014/main" id="{75360005-B2A6-87B1-94CE-AD5039877BCA}"/>
+                <a16:creationId xmlns:a16="http://schemas.microsoft.com/office/drawing/2014/main" id="{C90F98DA-EAFA-7AFA-4C6B-71C8CF5F7A52}"/>
               </a:ext>
             </a:extLst>
           </p:cNvPr>
-          <p:cNvPicPr>
-            <a:picLocks noGrp="1" noChangeAspect="1"/>
-          </p:cNvPicPr>
+          <p:cNvSpPr>
+            <a:spLocks noGrp="1"/>
+          </p:cNvSpPr>
           <p:nvPr>
             <p:ph idx="1"/>
           </p:nvPr>
-        </p:nvPicPr>
-        <p:blipFill>
-          <a:blip r:embed="rId2">
-            <a:extLst>
-              <a:ext uri="{28A0092B-C50C-407E-A947-70E740481C1C}">
-                <a14:useLocalDpi xmlns:a14="http://schemas.microsoft.com/office/drawing/2010/main" val="0"/>
-              </a:ext>
-            </a:extLst>
-          </a:blip>
-          <a:stretch>
-            <a:fillRect/>
-          </a:stretch>
-        </p:blipFill>
-        <p:spPr>
-          <a:xfrm>
-            <a:off x="135884" y="3299791"/>
-            <a:ext cx="12007373" cy="1113183"/>
-          </a:xfrm>
-        </p:spPr>
-      </p:pic>
+        </p:nvSpPr>
+        <p:spPr/>
+        <p:txBody>
+          <a:bodyPr/>
+          <a:lstStyle/>
+          <a:p>
+            <a:pPr>
+              <a:buFont typeface="Arial" panose="020B0604020202020204" pitchFamily="34" charset="0"/>
+              <a:buChar char="•"/>
+            </a:pPr>
+            <a:r>
+              <a:rPr lang="en-US" dirty="0"/>
+              <a:t>Speakers table: stores speaker information and submission status</a:t>
+            </a:r>
+          </a:p>
+          <a:p>
+            <a:pPr>
+              <a:buFont typeface="Arial" panose="020B0604020202020204" pitchFamily="34" charset="0"/>
+              <a:buChar char="•"/>
+            </a:pPr>
+            <a:r>
+              <a:rPr lang="en-US" dirty="0"/>
+              <a:t>Faculty table: manages faculty member accounts</a:t>
+            </a:r>
+          </a:p>
+          <a:p>
+            <a:pPr>
+              <a:buFont typeface="Arial" panose="020B0604020202020204" pitchFamily="34" charset="0"/>
+              <a:buChar char="•"/>
+            </a:pPr>
+            <a:r>
+              <a:rPr lang="en-US" dirty="0"/>
+              <a:t>Admins table: stores administrator account information</a:t>
+            </a:r>
+          </a:p>
+          <a:p>
+            <a:r>
+              <a:rPr lang="en-US" dirty="0"/>
+              <a:t>[Insert a screenshot or diagram of the database schema]</a:t>
+            </a:r>
+          </a:p>
+        </p:txBody>
+      </p:sp>
       <p:sp>
         <p:nvSpPr>
           <p:cNvPr id="4" name="Footer Placeholder 3">
             <a:extLst>
               <a:ext uri="{FF2B5EF4-FFF2-40B4-BE49-F238E27FC236}">
-                <a16:creationId xmlns:a16="http://schemas.microsoft.com/office/drawing/2014/main" id="{0CB1DE57-C864-DB64-E4E3-0422C25DEA33}"/>
+                <a16:creationId xmlns:a16="http://schemas.microsoft.com/office/drawing/2014/main" id="{34A844BB-161C-0584-E357-DEF77D14E6FF}"/>
               </a:ext>
             </a:extLst>
           </p:cNvPr>
@@ -6916,7 +7380,7 @@
           <p:cNvPr id="5" name="Slide Number Placeholder 4">
             <a:extLst>
               <a:ext uri="{FF2B5EF4-FFF2-40B4-BE49-F238E27FC236}">
-                <a16:creationId xmlns:a16="http://schemas.microsoft.com/office/drawing/2014/main" id="{52F98637-76F0-105E-6CFD-3B02F45FBC7F}"/>
+                <a16:creationId xmlns:a16="http://schemas.microsoft.com/office/drawing/2014/main" id="{9B670AD8-CD18-664C-B4FB-7D5E52BE4D4A}"/>
               </a:ext>
             </a:extLst>
           </p:cNvPr>
@@ -6943,7 +7407,7 @@
     </p:spTree>
     <p:extLst>
       <p:ext uri="{BB962C8B-B14F-4D97-AF65-F5344CB8AC3E}">
-        <p14:creationId xmlns:p14="http://schemas.microsoft.com/office/powerpoint/2010/main" val="2120358248"/>
+        <p14:creationId xmlns:p14="http://schemas.microsoft.com/office/powerpoint/2010/main" val="3951428390"/>
       </p:ext>
     </p:extLst>
   </p:cSld>

</xml_diff>